<commit_message>
Update IELTS 202 Speaking/How did I get 8.0 in IELTS Speaking.pptx
</commit_message>
<xml_diff>
--- a/IELTS 202 Speaking/How did I get 8.0 in IELTS Speaking.pptx
+++ b/IELTS 202 Speaking/How did I get 8.0 in IELTS Speaking.pptx
@@ -5,7 +5,7 @@
     <p:sldMasterId id="2147483648" r:id="rId1"/>
   </p:sldMasterIdLst>
   <p:notesMasterIdLst>
-    <p:notesMasterId r:id="rId64"/>
+    <p:notesMasterId r:id="rId66"/>
   </p:notesMasterIdLst>
   <p:sldIdLst>
     <p:sldId id="256" r:id="rId2"/>
@@ -41,35 +41,37 @@
     <p:sldId id="291" r:id="rId32"/>
     <p:sldId id="292" r:id="rId33"/>
     <p:sldId id="293" r:id="rId34"/>
-    <p:sldId id="294" r:id="rId35"/>
-    <p:sldId id="295" r:id="rId36"/>
-    <p:sldId id="296" r:id="rId37"/>
-    <p:sldId id="297" r:id="rId38"/>
-    <p:sldId id="298" r:id="rId39"/>
-    <p:sldId id="299" r:id="rId40"/>
-    <p:sldId id="300" r:id="rId41"/>
-    <p:sldId id="301" r:id="rId42"/>
-    <p:sldId id="278" r:id="rId43"/>
-    <p:sldId id="316" r:id="rId44"/>
-    <p:sldId id="317" r:id="rId45"/>
-    <p:sldId id="271" r:id="rId46"/>
-    <p:sldId id="262" r:id="rId47"/>
-    <p:sldId id="304" r:id="rId48"/>
-    <p:sldId id="283" r:id="rId49"/>
-    <p:sldId id="264" r:id="rId50"/>
-    <p:sldId id="324" r:id="rId51"/>
-    <p:sldId id="279" r:id="rId52"/>
-    <p:sldId id="272" r:id="rId53"/>
-    <p:sldId id="265" r:id="rId54"/>
-    <p:sldId id="280" r:id="rId55"/>
-    <p:sldId id="273" r:id="rId56"/>
-    <p:sldId id="266" r:id="rId57"/>
-    <p:sldId id="281" r:id="rId58"/>
-    <p:sldId id="274" r:id="rId59"/>
-    <p:sldId id="267" r:id="rId60"/>
-    <p:sldId id="285" r:id="rId61"/>
-    <p:sldId id="282" r:id="rId62"/>
-    <p:sldId id="275" r:id="rId63"/>
+    <p:sldId id="326" r:id="rId35"/>
+    <p:sldId id="294" r:id="rId36"/>
+    <p:sldId id="295" r:id="rId37"/>
+    <p:sldId id="296" r:id="rId38"/>
+    <p:sldId id="297" r:id="rId39"/>
+    <p:sldId id="298" r:id="rId40"/>
+    <p:sldId id="299" r:id="rId41"/>
+    <p:sldId id="300" r:id="rId42"/>
+    <p:sldId id="301" r:id="rId43"/>
+    <p:sldId id="278" r:id="rId44"/>
+    <p:sldId id="316" r:id="rId45"/>
+    <p:sldId id="317" r:id="rId46"/>
+    <p:sldId id="271" r:id="rId47"/>
+    <p:sldId id="325" r:id="rId48"/>
+    <p:sldId id="262" r:id="rId49"/>
+    <p:sldId id="304" r:id="rId50"/>
+    <p:sldId id="283" r:id="rId51"/>
+    <p:sldId id="264" r:id="rId52"/>
+    <p:sldId id="324" r:id="rId53"/>
+    <p:sldId id="279" r:id="rId54"/>
+    <p:sldId id="272" r:id="rId55"/>
+    <p:sldId id="265" r:id="rId56"/>
+    <p:sldId id="280" r:id="rId57"/>
+    <p:sldId id="273" r:id="rId58"/>
+    <p:sldId id="266" r:id="rId59"/>
+    <p:sldId id="281" r:id="rId60"/>
+    <p:sldId id="274" r:id="rId61"/>
+    <p:sldId id="267" r:id="rId62"/>
+    <p:sldId id="285" r:id="rId63"/>
+    <p:sldId id="282" r:id="rId64"/>
+    <p:sldId id="275" r:id="rId65"/>
   </p:sldIdLst>
   <p:sldSz cx="12192000" cy="6858000"/>
   <p:notesSz cx="6858000" cy="9144000"/>
@@ -218,6 +220,7 @@
             <p14:sldId id="291"/>
             <p14:sldId id="292"/>
             <p14:sldId id="293"/>
+            <p14:sldId id="326"/>
             <p14:sldId id="294"/>
             <p14:sldId id="295"/>
             <p14:sldId id="296"/>
@@ -230,6 +233,7 @@
             <p14:sldId id="316"/>
             <p14:sldId id="317"/>
             <p14:sldId id="271"/>
+            <p14:sldId id="325"/>
           </p14:sldIdLst>
         </p14:section>
         <p14:section name="PART 4" id="{59F29DB9-FE6C-4133-A79A-19C99C76529B}">
@@ -542,12 +546,7 @@
               <c:showBubbleSize val="0"/>
               <c:extLst>
                 <c:ext xmlns:c15="http://schemas.microsoft.com/office/drawing/2012/chart" uri="{CE6537A1-D6FC-4f65-9D91-7224C49458BB}">
-                  <c15:layout>
-                    <c:manualLayout>
-                      <c:w val="0.25071256038647344"/>
-                      <c:h val="0.31271882036478699"/>
-                    </c:manualLayout>
-                  </c15:layout>
+                  <c15:layout/>
                   <c15:dlblFieldTable/>
                   <c15:showDataLabelsRange val="0"/>
                 </c:ext>
@@ -643,12 +642,7 @@
               <c:showBubbleSize val="0"/>
               <c:extLst>
                 <c:ext xmlns:c15="http://schemas.microsoft.com/office/drawing/2012/chart" uri="{CE6537A1-D6FC-4f65-9D91-7224C49458BB}">
-                  <c15:layout>
-                    <c:manualLayout>
-                      <c:w val="0.26847826086956522"/>
-                      <c:h val="0.31271882036478699"/>
-                    </c:manualLayout>
-                  </c15:layout>
+                  <c15:layout/>
                   <c15:dlblFieldTable/>
                   <c15:showDataLabelsRange val="0"/>
                 </c:ext>
@@ -656,7 +650,6 @@
             </c:dLbl>
             <c:dLbl>
               <c:idx val="3"/>
-              <c:layout/>
               <c:spPr>
                 <a:noFill/>
                 <a:ln>
@@ -690,16 +683,6 @@
               <c:showSerName val="0"/>
               <c:showPercent val="1"/>
               <c:showBubbleSize val="0"/>
-              <c:extLst>
-                <c:ext xmlns:c15="http://schemas.microsoft.com/office/drawing/2012/chart" uri="{CE6537A1-D6FC-4f65-9D91-7224C49458BB}">
-                  <c15:layout>
-                    <c:manualLayout>
-                      <c:w val="0.30103864734299518"/>
-                      <c:h val="0.31271882036478699"/>
-                    </c:manualLayout>
-                  </c15:layout>
-                </c:ext>
-              </c:extLst>
             </c:dLbl>
             <c:spPr>
               <a:noFill/>
@@ -1106,12 +1089,7 @@
               <c:showBubbleSize val="0"/>
               <c:extLst>
                 <c:ext xmlns:c15="http://schemas.microsoft.com/office/drawing/2012/chart" uri="{CE6537A1-D6FC-4f65-9D91-7224C49458BB}">
-                  <c15:layout>
-                    <c:manualLayout>
-                      <c:w val="0.32076086956521743"/>
-                      <c:h val="0.31271882036478699"/>
-                    </c:manualLayout>
-                  </c15:layout>
+                  <c15:layout/>
                   <c15:dlblFieldTable/>
                   <c15:showDataLabelsRange val="0"/>
                 </c:ext>
@@ -1207,12 +1185,7 @@
               <c:showBubbleSize val="0"/>
               <c:extLst>
                 <c:ext xmlns:c15="http://schemas.microsoft.com/office/drawing/2012/chart" uri="{CE6537A1-D6FC-4f65-9D91-7224C49458BB}">
-                  <c15:layout>
-                    <c:manualLayout>
-                      <c:w val="0.28900966183574878"/>
-                      <c:h val="0.31271882036478699"/>
-                    </c:manualLayout>
-                  </c15:layout>
+                  <c15:layout/>
                   <c15:dlblFieldTable/>
                   <c15:showDataLabelsRange val="0"/>
                 </c:ext>
@@ -1220,7 +1193,6 @@
             </c:dLbl>
             <c:dLbl>
               <c:idx val="3"/>
-              <c:layout/>
               <c:spPr>
                 <a:noFill/>
                 <a:ln>
@@ -1254,16 +1226,6 @@
               <c:showSerName val="0"/>
               <c:showPercent val="1"/>
               <c:showBubbleSize val="0"/>
-              <c:extLst>
-                <c:ext xmlns:c15="http://schemas.microsoft.com/office/drawing/2012/chart" uri="{CE6537A1-D6FC-4f65-9D91-7224C49458BB}">
-                  <c15:layout>
-                    <c:manualLayout>
-                      <c:w val="0.33485507246376811"/>
-                      <c:h val="0.31271882036478699"/>
-                    </c:manualLayout>
-                  </c15:layout>
-                </c:ext>
-              </c:extLst>
             </c:dLbl>
             <c:spPr>
               <a:noFill/>
@@ -1964,7 +1926,6 @@
   </mc:AlternateContent>
   <c:chart>
     <c:title>
-      <c:layout/>
       <c:overlay val="0"/>
       <c:spPr>
         <a:noFill/>
@@ -2125,7 +2086,6 @@
             </c:dLbl>
             <c:dLbl>
               <c:idx val="1"/>
-              <c:layout/>
               <c:tx>
                 <c:rich>
                   <a:bodyPr rot="0" spcFirstLastPara="1" vertOverflow="ellipsis" vert="horz" wrap="square" lIns="38100" tIns="19050" rIns="38100" bIns="19050" anchor="ctr" anchorCtr="1">
@@ -2213,7 +2173,6 @@
               <c:showBubbleSize val="0"/>
               <c:extLst>
                 <c:ext xmlns:c15="http://schemas.microsoft.com/office/drawing/2012/chart" uri="{CE6537A1-D6FC-4f65-9D91-7224C49458BB}">
-                  <c15:layout/>
                   <c15:dlblFieldTable/>
                   <c15:showDataLabelsRange val="0"/>
                 </c:ext>
@@ -2221,7 +2180,6 @@
             </c:dLbl>
             <c:dLbl>
               <c:idx val="2"/>
-              <c:layout/>
               <c:tx>
                 <c:rich>
                   <a:bodyPr rot="0" spcFirstLastPara="1" vertOverflow="ellipsis" vert="horz" wrap="square" lIns="38100" tIns="19050" rIns="38100" bIns="19050" anchor="ctr" anchorCtr="1">
@@ -2309,7 +2267,6 @@
               <c:showBubbleSize val="0"/>
               <c:extLst>
                 <c:ext xmlns:c15="http://schemas.microsoft.com/office/drawing/2012/chart" uri="{CE6537A1-D6FC-4f65-9D91-7224C49458BB}">
-                  <c15:layout/>
                   <c15:dlblFieldTable/>
                   <c15:showDataLabelsRange val="0"/>
                 </c:ext>
@@ -4814,7 +4771,7 @@
           <a:p>
             <a:fld id="{0FB80877-3506-459B-AD35-493971D1E3D5}" type="datetimeFigureOut">
               <a:rPr lang="en-US" smtClean="0"/>
-              <a:t>10/31/2018</a:t>
+              <a:t>11/1/2018</a:t>
             </a:fld>
             <a:endParaRPr lang="en-US"/>
           </a:p>
@@ -5333,7 +5290,7 @@
           <a:p>
             <a:fld id="{EF5F6CF4-3526-49F8-81C0-7358A281477A}" type="slidenum">
               <a:rPr lang="en-US" smtClean="0"/>
-              <a:t>41</a:t>
+              <a:t>42</a:t>
             </a:fld>
             <a:endParaRPr lang="en-US"/>
           </a:p>
@@ -5831,7 +5788,7 @@
           <a:p>
             <a:fld id="{EF5F6CF4-3526-49F8-81C0-7358A281477A}" type="slidenum">
               <a:rPr lang="en-US" smtClean="0"/>
-              <a:t>34</a:t>
+              <a:t>35</a:t>
             </a:fld>
             <a:endParaRPr lang="en-US"/>
           </a:p>
@@ -5923,7 +5880,7 @@
           <a:p>
             <a:fld id="{EF5F6CF4-3526-49F8-81C0-7358A281477A}" type="slidenum">
               <a:rPr lang="en-US" smtClean="0"/>
-              <a:t>35</a:t>
+              <a:t>36</a:t>
             </a:fld>
             <a:endParaRPr lang="en-US"/>
           </a:p>
@@ -6109,7 +6066,7 @@
           <a:p>
             <a:fld id="{EF5F6CF4-3526-49F8-81C0-7358A281477A}" type="slidenum">
               <a:rPr lang="en-US" smtClean="0"/>
-              <a:t>38</a:t>
+              <a:t>39</a:t>
             </a:fld>
             <a:endParaRPr lang="en-US"/>
           </a:p>
@@ -6295,7 +6252,7 @@
           <a:p>
             <a:fld id="{EF5F6CF4-3526-49F8-81C0-7358A281477A}" type="slidenum">
               <a:rPr lang="en-US" smtClean="0"/>
-              <a:t>39</a:t>
+              <a:t>40</a:t>
             </a:fld>
             <a:endParaRPr lang="en-US"/>
           </a:p>
@@ -6481,7 +6438,7 @@
           <a:p>
             <a:fld id="{EF5F6CF4-3526-49F8-81C0-7358A281477A}" type="slidenum">
               <a:rPr lang="en-US" smtClean="0"/>
-              <a:t>40</a:t>
+              <a:t>41</a:t>
             </a:fld>
             <a:endParaRPr lang="en-US"/>
           </a:p>
@@ -6631,7 +6588,7 @@
           <a:p>
             <a:fld id="{498273F7-7DF0-45BB-80FE-450D5A6AF138}" type="datetimeFigureOut">
               <a:rPr lang="en-US" smtClean="0"/>
-              <a:t>10/31/2018</a:t>
+              <a:t>11/1/2018</a:t>
             </a:fld>
             <a:endParaRPr lang="en-US"/>
           </a:p>
@@ -6804,7 +6761,7 @@
           <a:p>
             <a:fld id="{498273F7-7DF0-45BB-80FE-450D5A6AF138}" type="datetimeFigureOut">
               <a:rPr lang="en-US" smtClean="0"/>
-              <a:t>10/31/2018</a:t>
+              <a:t>11/1/2018</a:t>
             </a:fld>
             <a:endParaRPr lang="en-US"/>
           </a:p>
@@ -6987,7 +6944,7 @@
           <a:p>
             <a:fld id="{498273F7-7DF0-45BB-80FE-450D5A6AF138}" type="datetimeFigureOut">
               <a:rPr lang="en-US" smtClean="0"/>
-              <a:t>10/31/2018</a:t>
+              <a:t>11/1/2018</a:t>
             </a:fld>
             <a:endParaRPr lang="en-US"/>
           </a:p>
@@ -7310,7 +7267,7 @@
           <a:p>
             <a:fld id="{498273F7-7DF0-45BB-80FE-450D5A6AF138}" type="datetimeFigureOut">
               <a:rPr lang="en-US" smtClean="0"/>
-              <a:t>10/31/2018</a:t>
+              <a:t>11/1/2018</a:t>
             </a:fld>
             <a:endParaRPr lang="en-US"/>
           </a:p>
@@ -7559,7 +7516,7 @@
           <a:p>
             <a:fld id="{498273F7-7DF0-45BB-80FE-450D5A6AF138}" type="datetimeFigureOut">
               <a:rPr lang="en-US" smtClean="0"/>
-              <a:t>10/31/2018</a:t>
+              <a:t>11/1/2018</a:t>
             </a:fld>
             <a:endParaRPr lang="en-US"/>
           </a:p>
@@ -7794,7 +7751,7 @@
           <a:p>
             <a:fld id="{498273F7-7DF0-45BB-80FE-450D5A6AF138}" type="datetimeFigureOut">
               <a:rPr lang="en-US" smtClean="0"/>
-              <a:t>10/31/2018</a:t>
+              <a:t>11/1/2018</a:t>
             </a:fld>
             <a:endParaRPr lang="en-US"/>
           </a:p>
@@ -8164,7 +8121,7 @@
           <a:p>
             <a:fld id="{498273F7-7DF0-45BB-80FE-450D5A6AF138}" type="datetimeFigureOut">
               <a:rPr lang="en-US" smtClean="0"/>
-              <a:t>10/31/2018</a:t>
+              <a:t>11/1/2018</a:t>
             </a:fld>
             <a:endParaRPr lang="en-US"/>
           </a:p>
@@ -8285,7 +8242,7 @@
           <a:p>
             <a:fld id="{498273F7-7DF0-45BB-80FE-450D5A6AF138}" type="datetimeFigureOut">
               <a:rPr lang="en-US" smtClean="0"/>
-              <a:t>10/31/2018</a:t>
+              <a:t>11/1/2018</a:t>
             </a:fld>
             <a:endParaRPr lang="en-US"/>
           </a:p>
@@ -8383,7 +8340,7 @@
           <a:p>
             <a:fld id="{498273F7-7DF0-45BB-80FE-450D5A6AF138}" type="datetimeFigureOut">
               <a:rPr lang="en-US" smtClean="0"/>
-              <a:t>10/31/2018</a:t>
+              <a:t>11/1/2018</a:t>
             </a:fld>
             <a:endParaRPr lang="en-US"/>
           </a:p>
@@ -8663,7 +8620,7 @@
           <a:p>
             <a:fld id="{498273F7-7DF0-45BB-80FE-450D5A6AF138}" type="datetimeFigureOut">
               <a:rPr lang="en-US" smtClean="0"/>
-              <a:t>10/31/2018</a:t>
+              <a:t>11/1/2018</a:t>
             </a:fld>
             <a:endParaRPr lang="en-US"/>
           </a:p>
@@ -8919,7 +8876,7 @@
           <a:p>
             <a:fld id="{498273F7-7DF0-45BB-80FE-450D5A6AF138}" type="datetimeFigureOut">
               <a:rPr lang="en-US" smtClean="0"/>
-              <a:t>10/31/2018</a:t>
+              <a:t>11/1/2018</a:t>
             </a:fld>
             <a:endParaRPr lang="en-US"/>
           </a:p>
@@ -9149,7 +9106,7 @@
           <a:p>
             <a:fld id="{498273F7-7DF0-45BB-80FE-450D5A6AF138}" type="datetimeFigureOut">
               <a:rPr lang="en-US" smtClean="0"/>
-              <a:t>10/31/2018</a:t>
+              <a:t>11/1/2018</a:t>
             </a:fld>
             <a:endParaRPr lang="en-US"/>
           </a:p>
@@ -20586,15 +20543,7 @@
             </a:r>
             <a:r>
               <a:rPr lang="en-US" sz="2200" dirty="0" smtClean="0"/>
-              <a:t>: In the first place, the </a:t>
-            </a:r>
-            <a:r>
-              <a:rPr lang="en-US" sz="2200" dirty="0" smtClean="0"/>
-              <a:t>apparent advancement </a:t>
-            </a:r>
-            <a:r>
-              <a:rPr lang="en-US" sz="2200" dirty="0" smtClean="0"/>
-              <a:t>of technologies around the film industry. E.g. </a:t>
+              <a:t>: In the first place, the apparent advancement of technologies around the film industry. E.g. </a:t>
             </a:r>
             <a:r>
               <a:rPr lang="en-US" sz="2000" dirty="0"/>
@@ -21909,6 +21858,374 @@
             <p:ph type="title"/>
           </p:nvPr>
         </p:nvSpPr>
+        <p:spPr/>
+        <p:txBody>
+          <a:bodyPr/>
+          <a:lstStyle/>
+          <a:p>
+            <a:endParaRPr lang="en-US"/>
+          </a:p>
+        </p:txBody>
+      </p:sp>
+      <p:sp>
+        <p:nvSpPr>
+          <p:cNvPr id="4" name="Content Placeholder 3"/>
+          <p:cNvSpPr>
+            <a:spLocks noGrp="1"/>
+          </p:cNvSpPr>
+          <p:nvPr>
+            <p:ph sz="half" idx="2"/>
+          </p:nvPr>
+        </p:nvSpPr>
+        <p:spPr/>
+        <p:txBody>
+          <a:bodyPr/>
+          <a:lstStyle/>
+          <a:p>
+            <a:endParaRPr lang="en-US"/>
+          </a:p>
+        </p:txBody>
+      </p:sp>
+      <p:sp>
+        <p:nvSpPr>
+          <p:cNvPr id="5" name="Content Placeholder 3"/>
+          <p:cNvSpPr>
+            <a:spLocks noGrp="1"/>
+          </p:cNvSpPr>
+          <p:nvPr>
+            <p:ph sz="half" idx="1"/>
+          </p:nvPr>
+        </p:nvSpPr>
+        <p:spPr/>
+        <p:style>
+          <a:lnRef idx="2">
+            <a:schemeClr val="accent3"/>
+          </a:lnRef>
+          <a:fillRef idx="1">
+            <a:schemeClr val="lt1"/>
+          </a:fillRef>
+          <a:effectRef idx="0">
+            <a:schemeClr val="accent3"/>
+          </a:effectRef>
+          <a:fontRef idx="minor">
+            <a:schemeClr val="dk1"/>
+          </a:fontRef>
+        </p:style>
+        <p:txBody>
+          <a:bodyPr>
+            <a:normAutofit/>
+          </a:bodyPr>
+          <a:lstStyle/>
+          <a:p>
+            <a:pPr marL="0" indent="0">
+              <a:buNone/>
+            </a:pPr>
+            <a:r>
+              <a:rPr lang="en-US" sz="2400" b="1" u="sng" dirty="0" smtClean="0"/>
+              <a:t>PART 3 Questions</a:t>
+            </a:r>
+          </a:p>
+          <a:p>
+            <a:pPr lvl="0"/>
+            <a:r>
+              <a:rPr lang="en-US" sz="2400" i="1" dirty="0"/>
+              <a:t>What are the possible causes of green-house effect? </a:t>
+            </a:r>
+          </a:p>
+          <a:p>
+            <a:pPr lvl="1"/>
+            <a:r>
+              <a:rPr lang="en-US" sz="2000" dirty="0"/>
+              <a:t>The green-house effect can be </a:t>
+            </a:r>
+            <a:r>
+              <a:rPr lang="en-US" sz="2000" b="1" dirty="0"/>
+              <a:t>stemmed from</a:t>
+            </a:r>
+            <a:r>
+              <a:rPr lang="en-US" sz="2000" dirty="0"/>
+              <a:t> </a:t>
+            </a:r>
+            <a:r>
+              <a:rPr lang="en-US" sz="2000" dirty="0" smtClean="0"/>
+              <a:t> a </a:t>
+            </a:r>
+            <a:r>
+              <a:rPr lang="en-US" sz="2000" b="1" dirty="0" smtClean="0"/>
+              <a:t>plethora</a:t>
+            </a:r>
+            <a:r>
+              <a:rPr lang="en-US" sz="2000" dirty="0" smtClean="0"/>
+              <a:t> </a:t>
+            </a:r>
+            <a:r>
+              <a:rPr lang="en-US" sz="2000" dirty="0"/>
+              <a:t>of sources. </a:t>
+            </a:r>
+            <a:r>
+              <a:rPr lang="en-US" sz="2000" b="1" dirty="0"/>
+              <a:t>The first &amp; foremost contributor would </a:t>
+            </a:r>
+            <a:r>
+              <a:rPr lang="en-US" sz="2000" dirty="0"/>
+              <a:t>be the amount of pollution by industrialization which emits carbon-di-oxide. In addition,</a:t>
+            </a:r>
+            <a:endParaRPr lang="en-US" sz="1800" dirty="0"/>
+          </a:p>
+        </p:txBody>
+      </p:sp>
+    </p:spTree>
+    <p:extLst>
+      <p:ext uri="{BB962C8B-B14F-4D97-AF65-F5344CB8AC3E}">
+        <p14:creationId xmlns:p14="http://schemas.microsoft.com/office/powerpoint/2010/main" val="2349087079"/>
+      </p:ext>
+    </p:extLst>
+  </p:cSld>
+  <p:clrMapOvr>
+    <a:masterClrMapping/>
+  </p:clrMapOvr>
+  <p:transition spd="slow">
+    <p:wipe/>
+  </p:transition>
+  <p:timing>
+    <p:tnLst>
+      <p:par>
+        <p:cTn id="1" dur="indefinite" restart="never" nodeType="tmRoot">
+          <p:childTnLst>
+            <p:seq concurrent="1" nextAc="seek">
+              <p:cTn id="2" dur="indefinite" nodeType="mainSeq">
+                <p:childTnLst>
+                  <p:par>
+                    <p:cTn id="3" fill="hold">
+                      <p:stCondLst>
+                        <p:cond delay="indefinite"/>
+                      </p:stCondLst>
+                      <p:childTnLst>
+                        <p:par>
+                          <p:cTn id="4" fill="hold">
+                            <p:stCondLst>
+                              <p:cond delay="0"/>
+                            </p:stCondLst>
+                            <p:childTnLst>
+                              <p:par>
+                                <p:cTn id="5" presetID="1" presetClass="entr" presetSubtype="0" fill="hold" grpId="0" nodeType="clickEffect">
+                                  <p:stCondLst>
+                                    <p:cond delay="0"/>
+                                  </p:stCondLst>
+                                  <p:childTnLst>
+                                    <p:set>
+                                      <p:cBhvr>
+                                        <p:cTn id="6" dur="1" fill="hold">
+                                          <p:stCondLst>
+                                            <p:cond delay="0"/>
+                                          </p:stCondLst>
+                                        </p:cTn>
+                                        <p:tgtEl>
+                                          <p:spTgt spid="5">
+                                            <p:bg/>
+                                          </p:spTgt>
+                                        </p:tgtEl>
+                                        <p:attrNameLst>
+                                          <p:attrName>style.visibility</p:attrName>
+                                        </p:attrNameLst>
+                                      </p:cBhvr>
+                                      <p:to>
+                                        <p:strVal val="visible"/>
+                                      </p:to>
+                                    </p:set>
+                                  </p:childTnLst>
+                                </p:cTn>
+                              </p:par>
+                            </p:childTnLst>
+                          </p:cTn>
+                        </p:par>
+                      </p:childTnLst>
+                    </p:cTn>
+                  </p:par>
+                  <p:par>
+                    <p:cTn id="7" fill="hold">
+                      <p:stCondLst>
+                        <p:cond delay="indefinite"/>
+                      </p:stCondLst>
+                      <p:childTnLst>
+                        <p:par>
+                          <p:cTn id="8" fill="hold">
+                            <p:stCondLst>
+                              <p:cond delay="0"/>
+                            </p:stCondLst>
+                            <p:childTnLst>
+                              <p:par>
+                                <p:cTn id="9" presetID="1" presetClass="entr" presetSubtype="0" fill="hold" grpId="0" nodeType="clickEffect">
+                                  <p:stCondLst>
+                                    <p:cond delay="0"/>
+                                  </p:stCondLst>
+                                  <p:childTnLst>
+                                    <p:set>
+                                      <p:cBhvr>
+                                        <p:cTn id="10" dur="1" fill="hold">
+                                          <p:stCondLst>
+                                            <p:cond delay="0"/>
+                                          </p:stCondLst>
+                                        </p:cTn>
+                                        <p:tgtEl>
+                                          <p:spTgt spid="5">
+                                            <p:txEl>
+                                              <p:pRg st="0" end="0"/>
+                                            </p:txEl>
+                                          </p:spTgt>
+                                        </p:tgtEl>
+                                        <p:attrNameLst>
+                                          <p:attrName>style.visibility</p:attrName>
+                                        </p:attrNameLst>
+                                      </p:cBhvr>
+                                      <p:to>
+                                        <p:strVal val="visible"/>
+                                      </p:to>
+                                    </p:set>
+                                  </p:childTnLst>
+                                </p:cTn>
+                              </p:par>
+                            </p:childTnLst>
+                          </p:cTn>
+                        </p:par>
+                      </p:childTnLst>
+                    </p:cTn>
+                  </p:par>
+                  <p:par>
+                    <p:cTn id="11" fill="hold">
+                      <p:stCondLst>
+                        <p:cond delay="indefinite"/>
+                      </p:stCondLst>
+                      <p:childTnLst>
+                        <p:par>
+                          <p:cTn id="12" fill="hold">
+                            <p:stCondLst>
+                              <p:cond delay="0"/>
+                            </p:stCondLst>
+                            <p:childTnLst>
+                              <p:par>
+                                <p:cTn id="13" presetID="1" presetClass="entr" presetSubtype="0" fill="hold" grpId="0" nodeType="clickEffect">
+                                  <p:stCondLst>
+                                    <p:cond delay="0"/>
+                                  </p:stCondLst>
+                                  <p:childTnLst>
+                                    <p:set>
+                                      <p:cBhvr>
+                                        <p:cTn id="14" dur="1" fill="hold">
+                                          <p:stCondLst>
+                                            <p:cond delay="0"/>
+                                          </p:stCondLst>
+                                        </p:cTn>
+                                        <p:tgtEl>
+                                          <p:spTgt spid="5">
+                                            <p:txEl>
+                                              <p:pRg st="1" end="1"/>
+                                            </p:txEl>
+                                          </p:spTgt>
+                                        </p:tgtEl>
+                                        <p:attrNameLst>
+                                          <p:attrName>style.visibility</p:attrName>
+                                        </p:attrNameLst>
+                                      </p:cBhvr>
+                                      <p:to>
+                                        <p:strVal val="visible"/>
+                                      </p:to>
+                                    </p:set>
+                                  </p:childTnLst>
+                                </p:cTn>
+                              </p:par>
+                              <p:par>
+                                <p:cTn id="15" presetID="1" presetClass="entr" presetSubtype="0" fill="hold" grpId="0" nodeType="withEffect">
+                                  <p:stCondLst>
+                                    <p:cond delay="0"/>
+                                  </p:stCondLst>
+                                  <p:childTnLst>
+                                    <p:set>
+                                      <p:cBhvr>
+                                        <p:cTn id="16" dur="1" fill="hold">
+                                          <p:stCondLst>
+                                            <p:cond delay="0"/>
+                                          </p:stCondLst>
+                                        </p:cTn>
+                                        <p:tgtEl>
+                                          <p:spTgt spid="5">
+                                            <p:txEl>
+                                              <p:pRg st="2" end="2"/>
+                                            </p:txEl>
+                                          </p:spTgt>
+                                        </p:tgtEl>
+                                        <p:attrNameLst>
+                                          <p:attrName>style.visibility</p:attrName>
+                                        </p:attrNameLst>
+                                      </p:cBhvr>
+                                      <p:to>
+                                        <p:strVal val="visible"/>
+                                      </p:to>
+                                    </p:set>
+                                  </p:childTnLst>
+                                </p:cTn>
+                              </p:par>
+                            </p:childTnLst>
+                          </p:cTn>
+                        </p:par>
+                      </p:childTnLst>
+                    </p:cTn>
+                  </p:par>
+                </p:childTnLst>
+              </p:cTn>
+              <p:prevCondLst>
+                <p:cond evt="onPrev" delay="0">
+                  <p:tgtEl>
+                    <p:sldTgt/>
+                  </p:tgtEl>
+                </p:cond>
+              </p:prevCondLst>
+              <p:nextCondLst>
+                <p:cond evt="onNext" delay="0">
+                  <p:tgtEl>
+                    <p:sldTgt/>
+                  </p:tgtEl>
+                </p:cond>
+              </p:nextCondLst>
+            </p:seq>
+          </p:childTnLst>
+        </p:cTn>
+      </p:par>
+    </p:tnLst>
+    <p:bldLst>
+      <p:bldP spid="5" grpId="0" build="p" animBg="1"/>
+    </p:bldLst>
+  </p:timing>
+</p:sld>
+</file>
+
+<file path=ppt/slides/slide35.xml><?xml version="1.0" encoding="utf-8"?>
+<p:sld xmlns:a="http://schemas.openxmlformats.org/drawingml/2006/main" xmlns:r="http://schemas.openxmlformats.org/officeDocument/2006/relationships" xmlns:p="http://schemas.openxmlformats.org/presentationml/2006/main">
+  <p:cSld>
+    <p:spTree>
+      <p:nvGrpSpPr>
+        <p:cNvPr id="1" name=""/>
+        <p:cNvGrpSpPr/>
+        <p:nvPr/>
+      </p:nvGrpSpPr>
+      <p:grpSpPr>
+        <a:xfrm>
+          <a:off x="0" y="0"/>
+          <a:ext cx="0" cy="0"/>
+          <a:chOff x="0" y="0"/>
+          <a:chExt cx="0" cy="0"/>
+        </a:xfrm>
+      </p:grpSpPr>
+      <p:sp>
+        <p:nvSpPr>
+          <p:cNvPr id="2" name="Title 1"/>
+          <p:cNvSpPr>
+            <a:spLocks noGrp="1"/>
+          </p:cNvSpPr>
+          <p:nvPr>
+            <p:ph type="title"/>
+          </p:nvPr>
+        </p:nvSpPr>
         <p:spPr>
           <a:xfrm>
             <a:off x="0" y="0"/>
@@ -22503,7 +22820,7 @@
 </p:sld>
 </file>
 
-<file path=ppt/slides/slide35.xml><?xml version="1.0" encoding="utf-8"?>
+<file path=ppt/slides/slide36.xml><?xml version="1.0" encoding="utf-8"?>
 <p:sld xmlns:a="http://schemas.openxmlformats.org/drawingml/2006/main" xmlns:r="http://schemas.openxmlformats.org/officeDocument/2006/relationships" xmlns:p="http://schemas.openxmlformats.org/presentationml/2006/main">
   <p:cSld>
     <p:spTree>
@@ -23298,7 +23615,7 @@
 </p:sld>
 </file>
 
-<file path=ppt/slides/slide36.xml><?xml version="1.0" encoding="utf-8"?>
+<file path=ppt/slides/slide37.xml><?xml version="1.0" encoding="utf-8"?>
 <p:sld xmlns:a="http://schemas.openxmlformats.org/drawingml/2006/main" xmlns:r="http://schemas.openxmlformats.org/officeDocument/2006/relationships" xmlns:p="http://schemas.openxmlformats.org/presentationml/2006/main">
   <p:cSld>
     <p:spTree>
@@ -23452,7 +23769,7 @@
 </p:sld>
 </file>
 
-<file path=ppt/slides/slide37.xml><?xml version="1.0" encoding="utf-8"?>
+<file path=ppt/slides/slide38.xml><?xml version="1.0" encoding="utf-8"?>
 <p:sld xmlns:a="http://schemas.openxmlformats.org/drawingml/2006/main" xmlns:r="http://schemas.openxmlformats.org/officeDocument/2006/relationships" xmlns:p="http://schemas.openxmlformats.org/presentationml/2006/main">
   <p:cSld>
     <p:spTree>
@@ -24363,7 +24680,7 @@
 </p:sld>
 </file>
 
-<file path=ppt/slides/slide38.xml><?xml version="1.0" encoding="utf-8"?>
+<file path=ppt/slides/slide39.xml><?xml version="1.0" encoding="utf-8"?>
 <p:sld xmlns:a="http://schemas.openxmlformats.org/drawingml/2006/main" xmlns:r="http://schemas.openxmlformats.org/officeDocument/2006/relationships" xmlns:p="http://schemas.openxmlformats.org/presentationml/2006/main">
   <p:cSld>
     <p:spTree>
@@ -24539,16 +24856,6 @@
             </a:r>
           </a:p>
           <a:p>
-            <a:pPr>
-              <a:buFont typeface="Wingdings" panose="05000000000000000000" pitchFamily="2" charset="2"/>
-              <a:buChar char="§"/>
-            </a:pPr>
-            <a:r>
-              <a:rPr lang="en-US" sz="2200" b="1" dirty="0" smtClean="0"/>
-              <a:t>.</a:t>
-            </a:r>
-          </a:p>
-          <a:p>
             <a:pPr lvl="1">
               <a:buFont typeface="Wingdings" panose="05000000000000000000" pitchFamily="2" charset="2"/>
               <a:buChar char="§"/>
@@ -24557,6 +24864,7 @@
               <a:rPr lang="en-US" sz="2200" dirty="0" smtClean="0"/>
               <a:t>.</a:t>
             </a:r>
+            <a:endParaRPr lang="en-US" sz="2200" dirty="0" smtClean="0"/>
           </a:p>
           <a:p>
             <a:pPr>
@@ -25007,464 +25315,6 @@
     <p:extLst>
       <p:ext uri="{BB962C8B-B14F-4D97-AF65-F5344CB8AC3E}">
         <p14:creationId xmlns:p14="http://schemas.microsoft.com/office/powerpoint/2010/main" val="2024519831"/>
-      </p:ext>
-    </p:extLst>
-  </p:cSld>
-  <p:clrMapOvr>
-    <a:masterClrMapping/>
-  </p:clrMapOvr>
-  <mc:AlternateContent xmlns:mc="http://schemas.openxmlformats.org/markup-compatibility/2006" xmlns:p14="http://schemas.microsoft.com/office/powerpoint/2010/main">
-    <mc:Choice Requires="p14">
-      <p:transition spd="slow" p14:dur="4400">
-        <p14:honeycomb/>
-      </p:transition>
-    </mc:Choice>
-    <mc:Fallback xmlns="">
-      <p:transition spd="slow">
-        <p:fade/>
-      </p:transition>
-    </mc:Fallback>
-  </mc:AlternateContent>
-  <p:timing>
-    <p:tnLst>
-      <p:par>
-        <p:cTn id="1" dur="indefinite" restart="never" nodeType="tmRoot"/>
-      </p:par>
-    </p:tnLst>
-  </p:timing>
-</p:sld>
-</file>
-
-<file path=ppt/slides/slide39.xml><?xml version="1.0" encoding="utf-8"?>
-<p:sld xmlns:a="http://schemas.openxmlformats.org/drawingml/2006/main" xmlns:r="http://schemas.openxmlformats.org/officeDocument/2006/relationships" xmlns:p="http://schemas.openxmlformats.org/presentationml/2006/main">
-  <p:cSld>
-    <p:spTree>
-      <p:nvGrpSpPr>
-        <p:cNvPr id="1" name=""/>
-        <p:cNvGrpSpPr/>
-        <p:nvPr/>
-      </p:nvGrpSpPr>
-      <p:grpSpPr>
-        <a:xfrm>
-          <a:off x="0" y="0"/>
-          <a:ext cx="0" cy="0"/>
-          <a:chOff x="0" y="0"/>
-          <a:chExt cx="0" cy="0"/>
-        </a:xfrm>
-      </p:grpSpPr>
-      <p:sp>
-        <p:nvSpPr>
-          <p:cNvPr id="2" name="Title 1"/>
-          <p:cNvSpPr>
-            <a:spLocks noGrp="1"/>
-          </p:cNvSpPr>
-          <p:nvPr>
-            <p:ph type="title"/>
-          </p:nvPr>
-        </p:nvSpPr>
-        <p:spPr>
-          <a:xfrm>
-            <a:off x="0" y="0"/>
-            <a:ext cx="12192000" cy="1325563"/>
-          </a:xfrm>
-          <a:effectLst>
-            <a:reflection blurRad="152400" endPos="33000" dir="5400000" sy="-100000" algn="bl" rotWithShape="0"/>
-          </a:effectLst>
-        </p:spPr>
-        <p:style>
-          <a:lnRef idx="0">
-            <a:scrgbClr r="0" g="0" b="0"/>
-          </a:lnRef>
-          <a:fillRef idx="1003">
-            <a:schemeClr val="lt1"/>
-          </a:fillRef>
-          <a:effectRef idx="0">
-            <a:scrgbClr r="0" g="0" b="0"/>
-          </a:effectRef>
-          <a:fontRef idx="major"/>
-        </p:style>
-        <p:txBody>
-          <a:bodyPr>
-            <a:normAutofit/>
-          </a:bodyPr>
-          <a:lstStyle/>
-          <a:p>
-            <a:pPr lvl="0" algn="ctr"/>
-            <a:r>
-              <a:rPr lang="en-US" sz="2400" dirty="0" smtClean="0"/>
-              <a:t>Speaking PART 3: </a:t>
-            </a:r>
-            <a:r>
-              <a:rPr lang="en-US" sz="3200" dirty="0" smtClean="0"/>
-              <a:t>Patterns of Questions</a:t>
-            </a:r>
-            <a:r>
-              <a:rPr lang="en-US" sz="4000" dirty="0" smtClean="0"/>
-              <a:t/>
-            </a:r>
-            <a:br>
-              <a:rPr lang="en-US" sz="4000" dirty="0" smtClean="0"/>
-            </a:br>
-            <a:r>
-              <a:rPr lang="en-US" sz="5300" b="1" dirty="0" smtClean="0"/>
-              <a:t>Agree/Disagree/Opinion</a:t>
-            </a:r>
-            <a:endParaRPr lang="en-US" b="1" dirty="0"/>
-          </a:p>
-        </p:txBody>
-      </p:sp>
-      <p:sp>
-        <p:nvSpPr>
-          <p:cNvPr id="3" name="Content Placeholder 2"/>
-          <p:cNvSpPr>
-            <a:spLocks noGrp="1"/>
-          </p:cNvSpPr>
-          <p:nvPr>
-            <p:ph sz="half" idx="1"/>
-          </p:nvPr>
-        </p:nvSpPr>
-        <p:spPr>
-          <a:xfrm>
-            <a:off x="343924" y="1325562"/>
-            <a:ext cx="5432036" cy="5319078"/>
-          </a:xfrm>
-        </p:spPr>
-        <p:style>
-          <a:lnRef idx="2">
-            <a:schemeClr val="accent5"/>
-          </a:lnRef>
-          <a:fillRef idx="1">
-            <a:schemeClr val="lt1"/>
-          </a:fillRef>
-          <a:effectRef idx="0">
-            <a:schemeClr val="accent5"/>
-          </a:effectRef>
-          <a:fontRef idx="minor">
-            <a:schemeClr val="dk1"/>
-          </a:fontRef>
-        </p:style>
-        <p:txBody>
-          <a:bodyPr>
-            <a:normAutofit/>
-          </a:bodyPr>
-          <a:lstStyle/>
-          <a:p>
-            <a:pPr marL="0" indent="0">
-              <a:buNone/>
-            </a:pPr>
-            <a:r>
-              <a:rPr lang="en-US" sz="2400" b="1" u="sng" dirty="0" smtClean="0"/>
-              <a:t>Vocabulary</a:t>
-            </a:r>
-          </a:p>
-          <a:p>
-            <a:pPr>
-              <a:buFont typeface="Wingdings" panose="05000000000000000000" pitchFamily="2" charset="2"/>
-              <a:buChar char="§"/>
-            </a:pPr>
-            <a:r>
-              <a:rPr lang="en-US" sz="2200" dirty="0" smtClean="0"/>
-              <a:t>Agree: concede, </a:t>
-            </a:r>
-            <a:endParaRPr lang="en-US" sz="2200" dirty="0"/>
-          </a:p>
-        </p:txBody>
-      </p:sp>
-      <p:sp>
-        <p:nvSpPr>
-          <p:cNvPr id="4" name="Content Placeholder 3"/>
-          <p:cNvSpPr>
-            <a:spLocks noGrp="1"/>
-          </p:cNvSpPr>
-          <p:nvPr>
-            <p:ph sz="half" idx="2"/>
-          </p:nvPr>
-        </p:nvSpPr>
-        <p:spPr>
-          <a:xfrm>
-            <a:off x="6096000" y="3916680"/>
-            <a:ext cx="5684520" cy="2727960"/>
-          </a:xfrm>
-        </p:spPr>
-        <p:style>
-          <a:lnRef idx="2">
-            <a:schemeClr val="accent3"/>
-          </a:lnRef>
-          <a:fillRef idx="1">
-            <a:schemeClr val="lt1"/>
-          </a:fillRef>
-          <a:effectRef idx="0">
-            <a:schemeClr val="accent3"/>
-          </a:effectRef>
-          <a:fontRef idx="minor">
-            <a:schemeClr val="dk1"/>
-          </a:fontRef>
-        </p:style>
-        <p:txBody>
-          <a:bodyPr>
-            <a:normAutofit/>
-          </a:bodyPr>
-          <a:lstStyle/>
-          <a:p>
-            <a:pPr marL="0" indent="0">
-              <a:buNone/>
-            </a:pPr>
-            <a:r>
-              <a:rPr lang="en-US" sz="2400" b="1" u="sng" dirty="0" smtClean="0"/>
-              <a:t>PART 3 Questions</a:t>
-            </a:r>
-          </a:p>
-          <a:p>
-            <a:pPr>
-              <a:buFont typeface="Wingdings" panose="05000000000000000000" pitchFamily="2" charset="2"/>
-              <a:buChar char="§"/>
-            </a:pPr>
-            <a:r>
-              <a:rPr lang="en-US" sz="2200" b="1" dirty="0" smtClean="0"/>
-              <a:t>.</a:t>
-            </a:r>
-          </a:p>
-          <a:p>
-            <a:pPr lvl="1">
-              <a:buFont typeface="Wingdings" panose="05000000000000000000" pitchFamily="2" charset="2"/>
-              <a:buChar char="§"/>
-            </a:pPr>
-            <a:r>
-              <a:rPr lang="en-US" sz="2200" dirty="0" smtClean="0"/>
-              <a:t>.</a:t>
-            </a:r>
-          </a:p>
-          <a:p>
-            <a:pPr>
-              <a:buFont typeface="Wingdings" panose="05000000000000000000" pitchFamily="2" charset="2"/>
-              <a:buChar char="§"/>
-            </a:pPr>
-            <a:endParaRPr lang="en-US" sz="2200" dirty="0"/>
-          </a:p>
-        </p:txBody>
-      </p:sp>
-      <p:sp>
-        <p:nvSpPr>
-          <p:cNvPr id="6" name="Content Placeholder 2"/>
-          <p:cNvSpPr txBox="1">
-            <a:spLocks/>
-          </p:cNvSpPr>
-          <p:nvPr/>
-        </p:nvSpPr>
-        <p:spPr>
-          <a:xfrm>
-            <a:off x="6096000" y="1325562"/>
-            <a:ext cx="5684520" cy="2591117"/>
-          </a:xfrm>
-          <a:prstGeom prst="rect">
-            <a:avLst/>
-          </a:prstGeom>
-        </p:spPr>
-        <p:style>
-          <a:lnRef idx="2">
-            <a:schemeClr val="accent5"/>
-          </a:lnRef>
-          <a:fillRef idx="1">
-            <a:schemeClr val="lt1"/>
-          </a:fillRef>
-          <a:effectRef idx="0">
-            <a:schemeClr val="accent5"/>
-          </a:effectRef>
-          <a:fontRef idx="minor">
-            <a:schemeClr val="dk1"/>
-          </a:fontRef>
-        </p:style>
-        <p:txBody>
-          <a:bodyPr vert="horz" lIns="91440" tIns="45720" rIns="91440" bIns="45720" rtlCol="0">
-            <a:normAutofit/>
-          </a:bodyPr>
-          <a:lstStyle>
-            <a:lvl1pPr marL="228600" indent="-228600" algn="l" defTabSz="914400" rtl="0" eaLnBrk="1" latinLnBrk="0" hangingPunct="1">
-              <a:lnSpc>
-                <a:spcPct val="90000"/>
-              </a:lnSpc>
-              <a:spcBef>
-                <a:spcPts val="1000"/>
-              </a:spcBef>
-              <a:buFont typeface="Arial" panose="020B0604020202020204" pitchFamily="34" charset="0"/>
-              <a:buChar char="•"/>
-              <a:defRPr sz="2800" kern="1200">
-                <a:solidFill>
-                  <a:schemeClr val="tx1"/>
-                </a:solidFill>
-                <a:latin typeface="+mn-lt"/>
-                <a:ea typeface="+mn-ea"/>
-                <a:cs typeface="+mn-cs"/>
-              </a:defRPr>
-            </a:lvl1pPr>
-            <a:lvl2pPr marL="685800" indent="-228600" algn="l" defTabSz="914400" rtl="0" eaLnBrk="1" latinLnBrk="0" hangingPunct="1">
-              <a:lnSpc>
-                <a:spcPct val="90000"/>
-              </a:lnSpc>
-              <a:spcBef>
-                <a:spcPts val="500"/>
-              </a:spcBef>
-              <a:buFont typeface="Arial" panose="020B0604020202020204" pitchFamily="34" charset="0"/>
-              <a:buChar char="•"/>
-              <a:defRPr sz="2400" kern="1200">
-                <a:solidFill>
-                  <a:schemeClr val="tx1"/>
-                </a:solidFill>
-                <a:latin typeface="+mn-lt"/>
-                <a:ea typeface="+mn-ea"/>
-                <a:cs typeface="+mn-cs"/>
-              </a:defRPr>
-            </a:lvl2pPr>
-            <a:lvl3pPr marL="1143000" indent="-228600" algn="l" defTabSz="914400" rtl="0" eaLnBrk="1" latinLnBrk="0" hangingPunct="1">
-              <a:lnSpc>
-                <a:spcPct val="90000"/>
-              </a:lnSpc>
-              <a:spcBef>
-                <a:spcPts val="500"/>
-              </a:spcBef>
-              <a:buFont typeface="Arial" panose="020B0604020202020204" pitchFamily="34" charset="0"/>
-              <a:buChar char="•"/>
-              <a:defRPr sz="2000" kern="1200">
-                <a:solidFill>
-                  <a:schemeClr val="tx1"/>
-                </a:solidFill>
-                <a:latin typeface="+mn-lt"/>
-                <a:ea typeface="+mn-ea"/>
-                <a:cs typeface="+mn-cs"/>
-              </a:defRPr>
-            </a:lvl3pPr>
-            <a:lvl4pPr marL="1600200" indent="-228600" algn="l" defTabSz="914400" rtl="0" eaLnBrk="1" latinLnBrk="0" hangingPunct="1">
-              <a:lnSpc>
-                <a:spcPct val="90000"/>
-              </a:lnSpc>
-              <a:spcBef>
-                <a:spcPts val="500"/>
-              </a:spcBef>
-              <a:buFont typeface="Arial" panose="020B0604020202020204" pitchFamily="34" charset="0"/>
-              <a:buChar char="•"/>
-              <a:defRPr sz="1800" kern="1200">
-                <a:solidFill>
-                  <a:schemeClr val="tx1"/>
-                </a:solidFill>
-                <a:latin typeface="+mn-lt"/>
-                <a:ea typeface="+mn-ea"/>
-                <a:cs typeface="+mn-cs"/>
-              </a:defRPr>
-            </a:lvl4pPr>
-            <a:lvl5pPr marL="2057400" indent="-228600" algn="l" defTabSz="914400" rtl="0" eaLnBrk="1" latinLnBrk="0" hangingPunct="1">
-              <a:lnSpc>
-                <a:spcPct val="90000"/>
-              </a:lnSpc>
-              <a:spcBef>
-                <a:spcPts val="500"/>
-              </a:spcBef>
-              <a:buFont typeface="Arial" panose="020B0604020202020204" pitchFamily="34" charset="0"/>
-              <a:buChar char="•"/>
-              <a:defRPr sz="1800" kern="1200">
-                <a:solidFill>
-                  <a:schemeClr val="tx1"/>
-                </a:solidFill>
-                <a:latin typeface="+mn-lt"/>
-                <a:ea typeface="+mn-ea"/>
-                <a:cs typeface="+mn-cs"/>
-              </a:defRPr>
-            </a:lvl5pPr>
-            <a:lvl6pPr marL="2514600" indent="-228600" algn="l" defTabSz="914400" rtl="0" eaLnBrk="1" latinLnBrk="0" hangingPunct="1">
-              <a:lnSpc>
-                <a:spcPct val="90000"/>
-              </a:lnSpc>
-              <a:spcBef>
-                <a:spcPts val="500"/>
-              </a:spcBef>
-              <a:buFont typeface="Arial" panose="020B0604020202020204" pitchFamily="34" charset="0"/>
-              <a:buChar char="•"/>
-              <a:defRPr sz="1800" kern="1200">
-                <a:solidFill>
-                  <a:schemeClr val="tx1"/>
-                </a:solidFill>
-                <a:latin typeface="+mn-lt"/>
-                <a:ea typeface="+mn-ea"/>
-                <a:cs typeface="+mn-cs"/>
-              </a:defRPr>
-            </a:lvl6pPr>
-            <a:lvl7pPr marL="2971800" indent="-228600" algn="l" defTabSz="914400" rtl="0" eaLnBrk="1" latinLnBrk="0" hangingPunct="1">
-              <a:lnSpc>
-                <a:spcPct val="90000"/>
-              </a:lnSpc>
-              <a:spcBef>
-                <a:spcPts val="500"/>
-              </a:spcBef>
-              <a:buFont typeface="Arial" panose="020B0604020202020204" pitchFamily="34" charset="0"/>
-              <a:buChar char="•"/>
-              <a:defRPr sz="1800" kern="1200">
-                <a:solidFill>
-                  <a:schemeClr val="tx1"/>
-                </a:solidFill>
-                <a:latin typeface="+mn-lt"/>
-                <a:ea typeface="+mn-ea"/>
-                <a:cs typeface="+mn-cs"/>
-              </a:defRPr>
-            </a:lvl7pPr>
-            <a:lvl8pPr marL="3429000" indent="-228600" algn="l" defTabSz="914400" rtl="0" eaLnBrk="1" latinLnBrk="0" hangingPunct="1">
-              <a:lnSpc>
-                <a:spcPct val="90000"/>
-              </a:lnSpc>
-              <a:spcBef>
-                <a:spcPts val="500"/>
-              </a:spcBef>
-              <a:buFont typeface="Arial" panose="020B0604020202020204" pitchFamily="34" charset="0"/>
-              <a:buChar char="•"/>
-              <a:defRPr sz="1800" kern="1200">
-                <a:solidFill>
-                  <a:schemeClr val="tx1"/>
-                </a:solidFill>
-                <a:latin typeface="+mn-lt"/>
-                <a:ea typeface="+mn-ea"/>
-                <a:cs typeface="+mn-cs"/>
-              </a:defRPr>
-            </a:lvl8pPr>
-            <a:lvl9pPr marL="3886200" indent="-228600" algn="l" defTabSz="914400" rtl="0" eaLnBrk="1" latinLnBrk="0" hangingPunct="1">
-              <a:lnSpc>
-                <a:spcPct val="90000"/>
-              </a:lnSpc>
-              <a:spcBef>
-                <a:spcPts val="500"/>
-              </a:spcBef>
-              <a:buFont typeface="Arial" panose="020B0604020202020204" pitchFamily="34" charset="0"/>
-              <a:buChar char="•"/>
-              <a:defRPr sz="1800" kern="1200">
-                <a:solidFill>
-                  <a:schemeClr val="tx1"/>
-                </a:solidFill>
-                <a:latin typeface="+mn-lt"/>
-                <a:ea typeface="+mn-ea"/>
-                <a:cs typeface="+mn-cs"/>
-              </a:defRPr>
-            </a:lvl9pPr>
-          </a:lstStyle>
-          <a:p>
-            <a:pPr marL="0" indent="0">
-              <a:buFont typeface="Arial" panose="020B0604020202020204" pitchFamily="34" charset="0"/>
-              <a:buNone/>
-            </a:pPr>
-            <a:r>
-              <a:rPr lang="en-US" sz="2400" b="1" u="sng" dirty="0" smtClean="0"/>
-              <a:t>Sentence Structure</a:t>
-            </a:r>
-          </a:p>
-          <a:p>
-            <a:pPr>
-              <a:buFont typeface="Wingdings" panose="05000000000000000000" pitchFamily="2" charset="2"/>
-              <a:buChar char="§"/>
-            </a:pPr>
-            <a:endParaRPr lang="en-US" sz="2200" b="1" dirty="0"/>
-          </a:p>
-        </p:txBody>
-      </p:sp>
-    </p:spTree>
-    <p:extLst>
-      <p:ext uri="{BB962C8B-B14F-4D97-AF65-F5344CB8AC3E}">
-        <p14:creationId xmlns:p14="http://schemas.microsoft.com/office/powerpoint/2010/main" val="2235005279"/>
       </p:ext>
     </p:extLst>
   </p:cSld>
@@ -28596,6 +28446,472 @@
             </a:br>
             <a:r>
               <a:rPr lang="en-US" sz="5300" b="1" dirty="0" smtClean="0"/>
+              <a:t>Agree/Disagree/Opinion</a:t>
+            </a:r>
+            <a:endParaRPr lang="en-US" b="1" dirty="0"/>
+          </a:p>
+        </p:txBody>
+      </p:sp>
+      <p:sp>
+        <p:nvSpPr>
+          <p:cNvPr id="3" name="Content Placeholder 2"/>
+          <p:cNvSpPr>
+            <a:spLocks noGrp="1"/>
+          </p:cNvSpPr>
+          <p:nvPr>
+            <p:ph sz="half" idx="1"/>
+          </p:nvPr>
+        </p:nvSpPr>
+        <p:spPr>
+          <a:xfrm>
+            <a:off x="343924" y="1325562"/>
+            <a:ext cx="5432036" cy="5319078"/>
+          </a:xfrm>
+        </p:spPr>
+        <p:style>
+          <a:lnRef idx="2">
+            <a:schemeClr val="accent5"/>
+          </a:lnRef>
+          <a:fillRef idx="1">
+            <a:schemeClr val="lt1"/>
+          </a:fillRef>
+          <a:effectRef idx="0">
+            <a:schemeClr val="accent5"/>
+          </a:effectRef>
+          <a:fontRef idx="minor">
+            <a:schemeClr val="dk1"/>
+          </a:fontRef>
+        </p:style>
+        <p:txBody>
+          <a:bodyPr>
+            <a:normAutofit/>
+          </a:bodyPr>
+          <a:lstStyle/>
+          <a:p>
+            <a:pPr marL="0" indent="0">
+              <a:buNone/>
+            </a:pPr>
+            <a:r>
+              <a:rPr lang="en-US" sz="2400" b="1" u="sng" dirty="0" smtClean="0"/>
+              <a:t>Vocabulary</a:t>
+            </a:r>
+          </a:p>
+          <a:p>
+            <a:pPr>
+              <a:buFont typeface="Wingdings" panose="05000000000000000000" pitchFamily="2" charset="2"/>
+              <a:buChar char="§"/>
+            </a:pPr>
+            <a:r>
+              <a:rPr lang="en-US" sz="2200" dirty="0" smtClean="0"/>
+              <a:t>Agree: concede, </a:t>
+            </a:r>
+            <a:endParaRPr lang="en-US" sz="2200" dirty="0"/>
+          </a:p>
+        </p:txBody>
+      </p:sp>
+      <p:sp>
+        <p:nvSpPr>
+          <p:cNvPr id="4" name="Content Placeholder 3"/>
+          <p:cNvSpPr>
+            <a:spLocks noGrp="1"/>
+          </p:cNvSpPr>
+          <p:nvPr>
+            <p:ph sz="half" idx="2"/>
+          </p:nvPr>
+        </p:nvSpPr>
+        <p:spPr>
+          <a:xfrm>
+            <a:off x="6096000" y="3916680"/>
+            <a:ext cx="5684520" cy="2727960"/>
+          </a:xfrm>
+        </p:spPr>
+        <p:style>
+          <a:lnRef idx="2">
+            <a:schemeClr val="accent3"/>
+          </a:lnRef>
+          <a:fillRef idx="1">
+            <a:schemeClr val="lt1"/>
+          </a:fillRef>
+          <a:effectRef idx="0">
+            <a:schemeClr val="accent3"/>
+          </a:effectRef>
+          <a:fontRef idx="minor">
+            <a:schemeClr val="dk1"/>
+          </a:fontRef>
+        </p:style>
+        <p:txBody>
+          <a:bodyPr>
+            <a:normAutofit/>
+          </a:bodyPr>
+          <a:lstStyle/>
+          <a:p>
+            <a:pPr marL="0" indent="0">
+              <a:buNone/>
+            </a:pPr>
+            <a:r>
+              <a:rPr lang="en-US" sz="2400" b="1" u="sng" dirty="0" smtClean="0"/>
+              <a:t>PART 3 Questions</a:t>
+            </a:r>
+          </a:p>
+          <a:p>
+            <a:pPr>
+              <a:buFont typeface="Wingdings" panose="05000000000000000000" pitchFamily="2" charset="2"/>
+              <a:buChar char="§"/>
+            </a:pPr>
+            <a:r>
+              <a:rPr lang="en-US" sz="2000" i="1" dirty="0"/>
+              <a:t>Some people say that people helped others more in the past than they do now. Do you agree or disagree?</a:t>
+            </a:r>
+            <a:endParaRPr lang="en-US" sz="2000" b="1" dirty="0"/>
+          </a:p>
+          <a:p>
+            <a:pPr>
+              <a:buFont typeface="Wingdings" panose="05000000000000000000" pitchFamily="2" charset="2"/>
+              <a:buChar char="§"/>
+            </a:pPr>
+            <a:endParaRPr lang="en-US" sz="2200" b="1" dirty="0" smtClean="0"/>
+          </a:p>
+          <a:p>
+            <a:pPr lvl="1">
+              <a:buFont typeface="Wingdings" panose="05000000000000000000" pitchFamily="2" charset="2"/>
+              <a:buChar char="§"/>
+            </a:pPr>
+            <a:r>
+              <a:rPr lang="en-US" sz="2200" dirty="0" smtClean="0"/>
+              <a:t>.</a:t>
+            </a:r>
+          </a:p>
+          <a:p>
+            <a:pPr>
+              <a:buFont typeface="Wingdings" panose="05000000000000000000" pitchFamily="2" charset="2"/>
+              <a:buChar char="§"/>
+            </a:pPr>
+            <a:endParaRPr lang="en-US" sz="2200" dirty="0"/>
+          </a:p>
+        </p:txBody>
+      </p:sp>
+      <p:sp>
+        <p:nvSpPr>
+          <p:cNvPr id="6" name="Content Placeholder 2"/>
+          <p:cNvSpPr txBox="1">
+            <a:spLocks/>
+          </p:cNvSpPr>
+          <p:nvPr/>
+        </p:nvSpPr>
+        <p:spPr>
+          <a:xfrm>
+            <a:off x="6096000" y="1325562"/>
+            <a:ext cx="5684520" cy="2591117"/>
+          </a:xfrm>
+          <a:prstGeom prst="rect">
+            <a:avLst/>
+          </a:prstGeom>
+        </p:spPr>
+        <p:style>
+          <a:lnRef idx="2">
+            <a:schemeClr val="accent5"/>
+          </a:lnRef>
+          <a:fillRef idx="1">
+            <a:schemeClr val="lt1"/>
+          </a:fillRef>
+          <a:effectRef idx="0">
+            <a:schemeClr val="accent5"/>
+          </a:effectRef>
+          <a:fontRef idx="minor">
+            <a:schemeClr val="dk1"/>
+          </a:fontRef>
+        </p:style>
+        <p:txBody>
+          <a:bodyPr vert="horz" lIns="91440" tIns="45720" rIns="91440" bIns="45720" rtlCol="0">
+            <a:normAutofit/>
+          </a:bodyPr>
+          <a:lstStyle>
+            <a:lvl1pPr marL="228600" indent="-228600" algn="l" defTabSz="914400" rtl="0" eaLnBrk="1" latinLnBrk="0" hangingPunct="1">
+              <a:lnSpc>
+                <a:spcPct val="90000"/>
+              </a:lnSpc>
+              <a:spcBef>
+                <a:spcPts val="1000"/>
+              </a:spcBef>
+              <a:buFont typeface="Arial" panose="020B0604020202020204" pitchFamily="34" charset="0"/>
+              <a:buChar char="•"/>
+              <a:defRPr sz="2800" kern="1200">
+                <a:solidFill>
+                  <a:schemeClr val="tx1"/>
+                </a:solidFill>
+                <a:latin typeface="+mn-lt"/>
+                <a:ea typeface="+mn-ea"/>
+                <a:cs typeface="+mn-cs"/>
+              </a:defRPr>
+            </a:lvl1pPr>
+            <a:lvl2pPr marL="685800" indent="-228600" algn="l" defTabSz="914400" rtl="0" eaLnBrk="1" latinLnBrk="0" hangingPunct="1">
+              <a:lnSpc>
+                <a:spcPct val="90000"/>
+              </a:lnSpc>
+              <a:spcBef>
+                <a:spcPts val="500"/>
+              </a:spcBef>
+              <a:buFont typeface="Arial" panose="020B0604020202020204" pitchFamily="34" charset="0"/>
+              <a:buChar char="•"/>
+              <a:defRPr sz="2400" kern="1200">
+                <a:solidFill>
+                  <a:schemeClr val="tx1"/>
+                </a:solidFill>
+                <a:latin typeface="+mn-lt"/>
+                <a:ea typeface="+mn-ea"/>
+                <a:cs typeface="+mn-cs"/>
+              </a:defRPr>
+            </a:lvl2pPr>
+            <a:lvl3pPr marL="1143000" indent="-228600" algn="l" defTabSz="914400" rtl="0" eaLnBrk="1" latinLnBrk="0" hangingPunct="1">
+              <a:lnSpc>
+                <a:spcPct val="90000"/>
+              </a:lnSpc>
+              <a:spcBef>
+                <a:spcPts val="500"/>
+              </a:spcBef>
+              <a:buFont typeface="Arial" panose="020B0604020202020204" pitchFamily="34" charset="0"/>
+              <a:buChar char="•"/>
+              <a:defRPr sz="2000" kern="1200">
+                <a:solidFill>
+                  <a:schemeClr val="tx1"/>
+                </a:solidFill>
+                <a:latin typeface="+mn-lt"/>
+                <a:ea typeface="+mn-ea"/>
+                <a:cs typeface="+mn-cs"/>
+              </a:defRPr>
+            </a:lvl3pPr>
+            <a:lvl4pPr marL="1600200" indent="-228600" algn="l" defTabSz="914400" rtl="0" eaLnBrk="1" latinLnBrk="0" hangingPunct="1">
+              <a:lnSpc>
+                <a:spcPct val="90000"/>
+              </a:lnSpc>
+              <a:spcBef>
+                <a:spcPts val="500"/>
+              </a:spcBef>
+              <a:buFont typeface="Arial" panose="020B0604020202020204" pitchFamily="34" charset="0"/>
+              <a:buChar char="•"/>
+              <a:defRPr sz="1800" kern="1200">
+                <a:solidFill>
+                  <a:schemeClr val="tx1"/>
+                </a:solidFill>
+                <a:latin typeface="+mn-lt"/>
+                <a:ea typeface="+mn-ea"/>
+                <a:cs typeface="+mn-cs"/>
+              </a:defRPr>
+            </a:lvl4pPr>
+            <a:lvl5pPr marL="2057400" indent="-228600" algn="l" defTabSz="914400" rtl="0" eaLnBrk="1" latinLnBrk="0" hangingPunct="1">
+              <a:lnSpc>
+                <a:spcPct val="90000"/>
+              </a:lnSpc>
+              <a:spcBef>
+                <a:spcPts val="500"/>
+              </a:spcBef>
+              <a:buFont typeface="Arial" panose="020B0604020202020204" pitchFamily="34" charset="0"/>
+              <a:buChar char="•"/>
+              <a:defRPr sz="1800" kern="1200">
+                <a:solidFill>
+                  <a:schemeClr val="tx1"/>
+                </a:solidFill>
+                <a:latin typeface="+mn-lt"/>
+                <a:ea typeface="+mn-ea"/>
+                <a:cs typeface="+mn-cs"/>
+              </a:defRPr>
+            </a:lvl5pPr>
+            <a:lvl6pPr marL="2514600" indent="-228600" algn="l" defTabSz="914400" rtl="0" eaLnBrk="1" latinLnBrk="0" hangingPunct="1">
+              <a:lnSpc>
+                <a:spcPct val="90000"/>
+              </a:lnSpc>
+              <a:spcBef>
+                <a:spcPts val="500"/>
+              </a:spcBef>
+              <a:buFont typeface="Arial" panose="020B0604020202020204" pitchFamily="34" charset="0"/>
+              <a:buChar char="•"/>
+              <a:defRPr sz="1800" kern="1200">
+                <a:solidFill>
+                  <a:schemeClr val="tx1"/>
+                </a:solidFill>
+                <a:latin typeface="+mn-lt"/>
+                <a:ea typeface="+mn-ea"/>
+                <a:cs typeface="+mn-cs"/>
+              </a:defRPr>
+            </a:lvl6pPr>
+            <a:lvl7pPr marL="2971800" indent="-228600" algn="l" defTabSz="914400" rtl="0" eaLnBrk="1" latinLnBrk="0" hangingPunct="1">
+              <a:lnSpc>
+                <a:spcPct val="90000"/>
+              </a:lnSpc>
+              <a:spcBef>
+                <a:spcPts val="500"/>
+              </a:spcBef>
+              <a:buFont typeface="Arial" panose="020B0604020202020204" pitchFamily="34" charset="0"/>
+              <a:buChar char="•"/>
+              <a:defRPr sz="1800" kern="1200">
+                <a:solidFill>
+                  <a:schemeClr val="tx1"/>
+                </a:solidFill>
+                <a:latin typeface="+mn-lt"/>
+                <a:ea typeface="+mn-ea"/>
+                <a:cs typeface="+mn-cs"/>
+              </a:defRPr>
+            </a:lvl7pPr>
+            <a:lvl8pPr marL="3429000" indent="-228600" algn="l" defTabSz="914400" rtl="0" eaLnBrk="1" latinLnBrk="0" hangingPunct="1">
+              <a:lnSpc>
+                <a:spcPct val="90000"/>
+              </a:lnSpc>
+              <a:spcBef>
+                <a:spcPts val="500"/>
+              </a:spcBef>
+              <a:buFont typeface="Arial" panose="020B0604020202020204" pitchFamily="34" charset="0"/>
+              <a:buChar char="•"/>
+              <a:defRPr sz="1800" kern="1200">
+                <a:solidFill>
+                  <a:schemeClr val="tx1"/>
+                </a:solidFill>
+                <a:latin typeface="+mn-lt"/>
+                <a:ea typeface="+mn-ea"/>
+                <a:cs typeface="+mn-cs"/>
+              </a:defRPr>
+            </a:lvl8pPr>
+            <a:lvl9pPr marL="3886200" indent="-228600" algn="l" defTabSz="914400" rtl="0" eaLnBrk="1" latinLnBrk="0" hangingPunct="1">
+              <a:lnSpc>
+                <a:spcPct val="90000"/>
+              </a:lnSpc>
+              <a:spcBef>
+                <a:spcPts val="500"/>
+              </a:spcBef>
+              <a:buFont typeface="Arial" panose="020B0604020202020204" pitchFamily="34" charset="0"/>
+              <a:buChar char="•"/>
+              <a:defRPr sz="1800" kern="1200">
+                <a:solidFill>
+                  <a:schemeClr val="tx1"/>
+                </a:solidFill>
+                <a:latin typeface="+mn-lt"/>
+                <a:ea typeface="+mn-ea"/>
+                <a:cs typeface="+mn-cs"/>
+              </a:defRPr>
+            </a:lvl9pPr>
+          </a:lstStyle>
+          <a:p>
+            <a:pPr marL="0" indent="0">
+              <a:buFont typeface="Arial" panose="020B0604020202020204" pitchFamily="34" charset="0"/>
+              <a:buNone/>
+            </a:pPr>
+            <a:r>
+              <a:rPr lang="en-US" sz="2400" b="1" u="sng" dirty="0" smtClean="0"/>
+              <a:t>Sentence Structure</a:t>
+            </a:r>
+          </a:p>
+          <a:p>
+            <a:pPr>
+              <a:buFont typeface="Wingdings" panose="05000000000000000000" pitchFamily="2" charset="2"/>
+              <a:buChar char="§"/>
+            </a:pPr>
+            <a:endParaRPr lang="en-US" sz="2200" b="1" dirty="0"/>
+          </a:p>
+        </p:txBody>
+      </p:sp>
+    </p:spTree>
+    <p:extLst>
+      <p:ext uri="{BB962C8B-B14F-4D97-AF65-F5344CB8AC3E}">
+        <p14:creationId xmlns:p14="http://schemas.microsoft.com/office/powerpoint/2010/main" val="2235005279"/>
+      </p:ext>
+    </p:extLst>
+  </p:cSld>
+  <p:clrMapOvr>
+    <a:masterClrMapping/>
+  </p:clrMapOvr>
+  <mc:AlternateContent xmlns:mc="http://schemas.openxmlformats.org/markup-compatibility/2006" xmlns:p14="http://schemas.microsoft.com/office/powerpoint/2010/main">
+    <mc:Choice Requires="p14">
+      <p:transition spd="slow" p14:dur="4400">
+        <p14:honeycomb/>
+      </p:transition>
+    </mc:Choice>
+    <mc:Fallback xmlns="">
+      <p:transition spd="slow">
+        <p:fade/>
+      </p:transition>
+    </mc:Fallback>
+  </mc:AlternateContent>
+  <p:timing>
+    <p:tnLst>
+      <p:par>
+        <p:cTn id="1" dur="indefinite" restart="never" nodeType="tmRoot"/>
+      </p:par>
+    </p:tnLst>
+  </p:timing>
+</p:sld>
+</file>
+
+<file path=ppt/slides/slide41.xml><?xml version="1.0" encoding="utf-8"?>
+<p:sld xmlns:a="http://schemas.openxmlformats.org/drawingml/2006/main" xmlns:r="http://schemas.openxmlformats.org/officeDocument/2006/relationships" xmlns:p="http://schemas.openxmlformats.org/presentationml/2006/main">
+  <p:cSld>
+    <p:spTree>
+      <p:nvGrpSpPr>
+        <p:cNvPr id="1" name=""/>
+        <p:cNvGrpSpPr/>
+        <p:nvPr/>
+      </p:nvGrpSpPr>
+      <p:grpSpPr>
+        <a:xfrm>
+          <a:off x="0" y="0"/>
+          <a:ext cx="0" cy="0"/>
+          <a:chOff x="0" y="0"/>
+          <a:chExt cx="0" cy="0"/>
+        </a:xfrm>
+      </p:grpSpPr>
+      <p:sp>
+        <p:nvSpPr>
+          <p:cNvPr id="2" name="Title 1"/>
+          <p:cNvSpPr>
+            <a:spLocks noGrp="1"/>
+          </p:cNvSpPr>
+          <p:nvPr>
+            <p:ph type="title"/>
+          </p:nvPr>
+        </p:nvSpPr>
+        <p:spPr>
+          <a:xfrm>
+            <a:off x="0" y="0"/>
+            <a:ext cx="12192000" cy="1325563"/>
+          </a:xfrm>
+          <a:effectLst>
+            <a:reflection blurRad="152400" endPos="33000" dir="5400000" sy="-100000" algn="bl" rotWithShape="0"/>
+          </a:effectLst>
+        </p:spPr>
+        <p:style>
+          <a:lnRef idx="0">
+            <a:scrgbClr r="0" g="0" b="0"/>
+          </a:lnRef>
+          <a:fillRef idx="1003">
+            <a:schemeClr val="lt1"/>
+          </a:fillRef>
+          <a:effectRef idx="0">
+            <a:scrgbClr r="0" g="0" b="0"/>
+          </a:effectRef>
+          <a:fontRef idx="major"/>
+        </p:style>
+        <p:txBody>
+          <a:bodyPr>
+            <a:normAutofit/>
+          </a:bodyPr>
+          <a:lstStyle/>
+          <a:p>
+            <a:pPr lvl="0" algn="ctr"/>
+            <a:r>
+              <a:rPr lang="en-US" sz="2400" dirty="0" smtClean="0"/>
+              <a:t>Speaking PART 3: </a:t>
+            </a:r>
+            <a:r>
+              <a:rPr lang="en-US" sz="3200" dirty="0" smtClean="0"/>
+              <a:t>Patterns of Questions</a:t>
+            </a:r>
+            <a:r>
+              <a:rPr lang="en-US" sz="4000" dirty="0" smtClean="0"/>
+              <a:t/>
+            </a:r>
+            <a:br>
+              <a:rPr lang="en-US" sz="4000" dirty="0" smtClean="0"/>
+            </a:br>
+            <a:r>
+              <a:rPr lang="en-US" sz="5300" b="1" dirty="0" smtClean="0"/>
               <a:t>Hypothetical</a:t>
             </a:r>
             <a:endParaRPr lang="en-US" b="1" dirty="0"/>
@@ -28705,19 +29021,21 @@
               <a:buChar char="§"/>
             </a:pPr>
             <a:r>
-              <a:rPr lang="en-US" sz="2200" b="1" dirty="0" smtClean="0"/>
-              <a:t>.</a:t>
-            </a:r>
+              <a:rPr lang="en-US" sz="2400" i="1" dirty="0" smtClean="0"/>
+              <a:t>If you were an doctor, how’d you contribute to the </a:t>
+            </a:r>
+            <a:r>
+              <a:rPr lang="en-US" sz="2400" i="1" smtClean="0"/>
+              <a:t>medical industry?</a:t>
+            </a:r>
+            <a:endParaRPr lang="en-US" sz="2200" b="1" dirty="0" smtClean="0"/>
           </a:p>
           <a:p>
             <a:pPr lvl="1">
               <a:buFont typeface="Wingdings" panose="05000000000000000000" pitchFamily="2" charset="2"/>
               <a:buChar char="§"/>
             </a:pPr>
-            <a:r>
-              <a:rPr lang="en-US" sz="2200" dirty="0" smtClean="0"/>
-              <a:t>.</a:t>
-            </a:r>
+            <a:endParaRPr lang="en-US" sz="2200" dirty="0" smtClean="0"/>
           </a:p>
           <a:p>
             <a:pPr>
@@ -29196,7 +29514,7 @@
 </p:sld>
 </file>
 
-<file path=ppt/slides/slide41.xml><?xml version="1.0" encoding="utf-8"?>
+<file path=ppt/slides/slide42.xml><?xml version="1.0" encoding="utf-8"?>
 <p:sld xmlns:a="http://schemas.openxmlformats.org/drawingml/2006/main" xmlns:r="http://schemas.openxmlformats.org/officeDocument/2006/relationships" xmlns:p="http://schemas.openxmlformats.org/presentationml/2006/main">
   <p:cSld>
     <p:spTree>
@@ -29995,7 +30313,7 @@
 </p:sld>
 </file>
 
-<file path=ppt/slides/slide42.xml><?xml version="1.0" encoding="utf-8"?>
+<file path=ppt/slides/slide43.xml><?xml version="1.0" encoding="utf-8"?>
 <p:sld xmlns:a="http://schemas.openxmlformats.org/drawingml/2006/main" xmlns:r="http://schemas.openxmlformats.org/officeDocument/2006/relationships" xmlns:p="http://schemas.openxmlformats.org/presentationml/2006/main">
   <p:cSld>
     <p:spTree>
@@ -30146,7 +30464,7 @@
 </p:sld>
 </file>
 
-<file path=ppt/slides/slide43.xml><?xml version="1.0" encoding="utf-8"?>
+<file path=ppt/slides/slide44.xml><?xml version="1.0" encoding="utf-8"?>
 <p:sld xmlns:a="http://schemas.openxmlformats.org/drawingml/2006/main" xmlns:r="http://schemas.openxmlformats.org/officeDocument/2006/relationships" xmlns:p="http://schemas.openxmlformats.org/presentationml/2006/main">
   <p:cSld>
     <p:spTree>
@@ -30253,7 +30571,7 @@
 </p:sld>
 </file>
 
-<file path=ppt/slides/slide44.xml><?xml version="1.0" encoding="utf-8"?>
+<file path=ppt/slides/slide45.xml><?xml version="1.0" encoding="utf-8"?>
 <p:sld xmlns:a="http://schemas.openxmlformats.org/drawingml/2006/main" xmlns:r="http://schemas.openxmlformats.org/officeDocument/2006/relationships" xmlns:p="http://schemas.openxmlformats.org/presentationml/2006/main">
   <p:cSld>
     <p:spTree>
@@ -30358,159 +30676,6 @@
     <p:extLst>
       <p:ext uri="{BB962C8B-B14F-4D97-AF65-F5344CB8AC3E}">
         <p14:creationId xmlns:p14="http://schemas.microsoft.com/office/powerpoint/2010/main" val="1148421660"/>
-      </p:ext>
-    </p:extLst>
-  </p:cSld>
-  <p:clrMapOvr>
-    <a:masterClrMapping/>
-  </p:clrMapOvr>
-  <mc:AlternateContent xmlns:mc="http://schemas.openxmlformats.org/markup-compatibility/2006" xmlns:p14="http://schemas.microsoft.com/office/powerpoint/2010/main">
-    <mc:Choice Requires="p14">
-      <p:transition spd="slow" p14:dur="4400">
-        <p14:honeycomb/>
-      </p:transition>
-    </mc:Choice>
-    <mc:Fallback xmlns="">
-      <p:transition spd="slow">
-        <p:fade/>
-      </p:transition>
-    </mc:Fallback>
-  </mc:AlternateContent>
-  <p:timing>
-    <p:tnLst>
-      <p:par>
-        <p:cTn id="1" dur="indefinite" restart="never" nodeType="tmRoot"/>
-      </p:par>
-    </p:tnLst>
-  </p:timing>
-</p:sld>
-</file>
-
-<file path=ppt/slides/slide45.xml><?xml version="1.0" encoding="utf-8"?>
-<p:sld xmlns:a="http://schemas.openxmlformats.org/drawingml/2006/main" xmlns:r="http://schemas.openxmlformats.org/officeDocument/2006/relationships" xmlns:p="http://schemas.openxmlformats.org/presentationml/2006/main">
-  <p:cSld>
-    <p:spTree>
-      <p:nvGrpSpPr>
-        <p:cNvPr id="1" name=""/>
-        <p:cNvGrpSpPr/>
-        <p:nvPr/>
-      </p:nvGrpSpPr>
-      <p:grpSpPr>
-        <a:xfrm>
-          <a:off x="0" y="0"/>
-          <a:ext cx="0" cy="0"/>
-          <a:chOff x="0" y="0"/>
-          <a:chExt cx="0" cy="0"/>
-        </a:xfrm>
-      </p:grpSpPr>
-      <p:sp>
-        <p:nvSpPr>
-          <p:cNvPr id="2" name="Title 1"/>
-          <p:cNvSpPr>
-            <a:spLocks noGrp="1"/>
-          </p:cNvSpPr>
-          <p:nvPr>
-            <p:ph type="title"/>
-          </p:nvPr>
-        </p:nvSpPr>
-        <p:spPr>
-          <a:xfrm>
-            <a:off x="576775" y="365125"/>
-            <a:ext cx="11057207" cy="1325563"/>
-          </a:xfrm>
-        </p:spPr>
-        <p:txBody>
-          <a:bodyPr>
-            <a:normAutofit/>
-          </a:bodyPr>
-          <a:lstStyle/>
-          <a:p>
-            <a:r>
-              <a:rPr lang="en-US" b="1" dirty="0" smtClean="0"/>
-              <a:t>Sources</a:t>
-            </a:r>
-            <a:r>
-              <a:rPr lang="en-US" dirty="0" smtClean="0"/>
-              <a:t> to improve IELTS Speaking </a:t>
-            </a:r>
-            <a:r>
-              <a:rPr lang="en-US" b="1" dirty="0" smtClean="0"/>
-              <a:t>PART 3</a:t>
-            </a:r>
-            <a:endParaRPr lang="en-US" b="1" dirty="0"/>
-          </a:p>
-        </p:txBody>
-      </p:sp>
-      <p:sp>
-        <p:nvSpPr>
-          <p:cNvPr id="4" name="Content Placeholder 3"/>
-          <p:cNvSpPr>
-            <a:spLocks noGrp="1"/>
-          </p:cNvSpPr>
-          <p:nvPr>
-            <p:ph sz="half" idx="1"/>
-          </p:nvPr>
-        </p:nvSpPr>
-        <p:spPr>
-          <a:xfrm>
-            <a:off x="576775" y="1825625"/>
-            <a:ext cx="5443025" cy="4351338"/>
-          </a:xfrm>
-        </p:spPr>
-        <p:txBody>
-          <a:bodyPr/>
-          <a:lstStyle/>
-          <a:p>
-            <a:pPr>
-              <a:buFont typeface="Wingdings" panose="05000000000000000000" pitchFamily="2" charset="2"/>
-              <a:buChar char="§"/>
-            </a:pPr>
-            <a:r>
-              <a:rPr lang="en-US" dirty="0"/>
-              <a:t>http://ieltsspeakingquestions.blogspot.com/2012/12/index-ielts-part-3-speaking-questions.html</a:t>
-            </a:r>
-          </a:p>
-          <a:p>
-            <a:pPr>
-              <a:buFont typeface="Wingdings" panose="05000000000000000000" pitchFamily="2" charset="2"/>
-              <a:buChar char="§"/>
-            </a:pPr>
-            <a:endParaRPr lang="en-US" dirty="0"/>
-          </a:p>
-        </p:txBody>
-      </p:sp>
-      <p:sp>
-        <p:nvSpPr>
-          <p:cNvPr id="5" name="Content Placeholder 4"/>
-          <p:cNvSpPr>
-            <a:spLocks noGrp="1"/>
-          </p:cNvSpPr>
-          <p:nvPr>
-            <p:ph sz="half" idx="2"/>
-          </p:nvPr>
-        </p:nvSpPr>
-        <p:spPr>
-          <a:xfrm>
-            <a:off x="6172200" y="1825625"/>
-            <a:ext cx="5461782" cy="4351338"/>
-          </a:xfrm>
-        </p:spPr>
-        <p:txBody>
-          <a:bodyPr/>
-          <a:lstStyle/>
-          <a:p>
-            <a:pPr>
-              <a:buFont typeface="Wingdings" panose="05000000000000000000" pitchFamily="2" charset="2"/>
-              <a:buChar char="§"/>
-            </a:pPr>
-            <a:endParaRPr lang="en-US" dirty="0"/>
-          </a:p>
-        </p:txBody>
-      </p:sp>
-    </p:spTree>
-    <p:extLst>
-      <p:ext uri="{BB962C8B-B14F-4D97-AF65-F5344CB8AC3E}">
-        <p14:creationId xmlns:p14="http://schemas.microsoft.com/office/powerpoint/2010/main" val="4001384753"/>
       </p:ext>
     </p:extLst>
   </p:cSld>
@@ -30558,6 +30723,280 @@
       </p:grpSpPr>
       <p:sp>
         <p:nvSpPr>
+          <p:cNvPr id="2" name="Title 1"/>
+          <p:cNvSpPr>
+            <a:spLocks noGrp="1"/>
+          </p:cNvSpPr>
+          <p:nvPr>
+            <p:ph type="title"/>
+          </p:nvPr>
+        </p:nvSpPr>
+        <p:spPr>
+          <a:xfrm>
+            <a:off x="576775" y="365125"/>
+            <a:ext cx="11057207" cy="1325563"/>
+          </a:xfrm>
+        </p:spPr>
+        <p:txBody>
+          <a:bodyPr>
+            <a:normAutofit/>
+          </a:bodyPr>
+          <a:lstStyle/>
+          <a:p>
+            <a:r>
+              <a:rPr lang="en-US" b="1" dirty="0" smtClean="0"/>
+              <a:t>Sources</a:t>
+            </a:r>
+            <a:r>
+              <a:rPr lang="en-US" dirty="0" smtClean="0"/>
+              <a:t> to improve IELTS Speaking </a:t>
+            </a:r>
+            <a:r>
+              <a:rPr lang="en-US" b="1" dirty="0" smtClean="0"/>
+              <a:t>PART 3</a:t>
+            </a:r>
+            <a:endParaRPr lang="en-US" b="1" dirty="0"/>
+          </a:p>
+        </p:txBody>
+      </p:sp>
+      <p:sp>
+        <p:nvSpPr>
+          <p:cNvPr id="4" name="Content Placeholder 3"/>
+          <p:cNvSpPr>
+            <a:spLocks noGrp="1"/>
+          </p:cNvSpPr>
+          <p:nvPr>
+            <p:ph sz="half" idx="1"/>
+          </p:nvPr>
+        </p:nvSpPr>
+        <p:spPr>
+          <a:xfrm>
+            <a:off x="576775" y="1825625"/>
+            <a:ext cx="5443025" cy="4351338"/>
+          </a:xfrm>
+        </p:spPr>
+        <p:txBody>
+          <a:bodyPr/>
+          <a:lstStyle/>
+          <a:p>
+            <a:pPr>
+              <a:buFont typeface="Wingdings" panose="05000000000000000000" pitchFamily="2" charset="2"/>
+              <a:buChar char="§"/>
+            </a:pPr>
+            <a:r>
+              <a:rPr lang="en-US" dirty="0"/>
+              <a:t>http://ieltsspeakingquestions.blogspot.com/2012/12/index-ielts-part-3-speaking-questions.html</a:t>
+            </a:r>
+          </a:p>
+          <a:p>
+            <a:pPr>
+              <a:buFont typeface="Wingdings" panose="05000000000000000000" pitchFamily="2" charset="2"/>
+              <a:buChar char="§"/>
+            </a:pPr>
+            <a:endParaRPr lang="en-US" dirty="0"/>
+          </a:p>
+        </p:txBody>
+      </p:sp>
+      <p:sp>
+        <p:nvSpPr>
+          <p:cNvPr id="5" name="Content Placeholder 4"/>
+          <p:cNvSpPr>
+            <a:spLocks noGrp="1"/>
+          </p:cNvSpPr>
+          <p:nvPr>
+            <p:ph sz="half" idx="2"/>
+          </p:nvPr>
+        </p:nvSpPr>
+        <p:spPr>
+          <a:xfrm>
+            <a:off x="6172200" y="1825625"/>
+            <a:ext cx="5461782" cy="4351338"/>
+          </a:xfrm>
+        </p:spPr>
+        <p:txBody>
+          <a:bodyPr/>
+          <a:lstStyle/>
+          <a:p>
+            <a:pPr>
+              <a:buFont typeface="Wingdings" panose="05000000000000000000" pitchFamily="2" charset="2"/>
+              <a:buChar char="§"/>
+            </a:pPr>
+            <a:endParaRPr lang="en-US" dirty="0"/>
+          </a:p>
+        </p:txBody>
+      </p:sp>
+    </p:spTree>
+    <p:extLst>
+      <p:ext uri="{BB962C8B-B14F-4D97-AF65-F5344CB8AC3E}">
+        <p14:creationId xmlns:p14="http://schemas.microsoft.com/office/powerpoint/2010/main" val="4001384753"/>
+      </p:ext>
+    </p:extLst>
+  </p:cSld>
+  <p:clrMapOvr>
+    <a:masterClrMapping/>
+  </p:clrMapOvr>
+  <mc:AlternateContent xmlns:mc="http://schemas.openxmlformats.org/markup-compatibility/2006" xmlns:p14="http://schemas.microsoft.com/office/powerpoint/2010/main">
+    <mc:Choice Requires="p14">
+      <p:transition spd="slow" p14:dur="4400">
+        <p14:honeycomb/>
+      </p:transition>
+    </mc:Choice>
+    <mc:Fallback xmlns="">
+      <p:transition spd="slow">
+        <p:fade/>
+      </p:transition>
+    </mc:Fallback>
+  </mc:AlternateContent>
+  <p:timing>
+    <p:tnLst>
+      <p:par>
+        <p:cTn id="1" dur="indefinite" restart="never" nodeType="tmRoot"/>
+      </p:par>
+    </p:tnLst>
+  </p:timing>
+</p:sld>
+</file>
+
+<file path=ppt/slides/slide47.xml><?xml version="1.0" encoding="utf-8"?>
+<p:sld xmlns:a="http://schemas.openxmlformats.org/drawingml/2006/main" xmlns:r="http://schemas.openxmlformats.org/officeDocument/2006/relationships" xmlns:p="http://schemas.openxmlformats.org/presentationml/2006/main">
+  <p:cSld>
+    <p:spTree>
+      <p:nvGrpSpPr>
+        <p:cNvPr id="1" name=""/>
+        <p:cNvGrpSpPr/>
+        <p:nvPr/>
+      </p:nvGrpSpPr>
+      <p:grpSpPr>
+        <a:xfrm>
+          <a:off x="0" y="0"/>
+          <a:ext cx="0" cy="0"/>
+          <a:chOff x="0" y="0"/>
+          <a:chExt cx="0" cy="0"/>
+        </a:xfrm>
+      </p:grpSpPr>
+      <p:sp>
+        <p:nvSpPr>
+          <p:cNvPr id="2" name="Title 1"/>
+          <p:cNvSpPr>
+            <a:spLocks noGrp="1"/>
+          </p:cNvSpPr>
+          <p:nvPr>
+            <p:ph type="title"/>
+          </p:nvPr>
+        </p:nvSpPr>
+        <p:spPr/>
+        <p:txBody>
+          <a:bodyPr/>
+          <a:lstStyle/>
+          <a:p>
+            <a:r>
+              <a:rPr lang="en-US" dirty="0" smtClean="0"/>
+              <a:t>Tips for PART 3</a:t>
+            </a:r>
+            <a:r>
+              <a:rPr lang="en-US" dirty="0" smtClean="0"/>
+              <a:t>	</a:t>
+            </a:r>
+            <a:endParaRPr lang="en-US" dirty="0"/>
+          </a:p>
+        </p:txBody>
+      </p:sp>
+      <p:sp>
+        <p:nvSpPr>
+          <p:cNvPr id="3" name="Content Placeholder 2"/>
+          <p:cNvSpPr>
+            <a:spLocks noGrp="1"/>
+          </p:cNvSpPr>
+          <p:nvPr>
+            <p:ph sz="half" idx="1"/>
+          </p:nvPr>
+        </p:nvSpPr>
+        <p:spPr/>
+        <p:txBody>
+          <a:bodyPr/>
+          <a:lstStyle/>
+          <a:p>
+            <a:r>
+              <a:rPr lang="en-US" dirty="0" smtClean="0"/>
+              <a:t>Build vocabulary on top 10 topics</a:t>
+            </a:r>
+          </a:p>
+          <a:p>
+            <a:r>
+              <a:rPr lang="en-US" dirty="0" smtClean="0"/>
+              <a:t>Practice previous </a:t>
+            </a:r>
+            <a:r>
+              <a:rPr lang="en-US" dirty="0" smtClean="0"/>
+              <a:t>questions</a:t>
+            </a:r>
+          </a:p>
+          <a:p>
+            <a:r>
+              <a:rPr lang="en-US" dirty="0" smtClean="0"/>
+              <a:t>Focus on Grammar</a:t>
+            </a:r>
+            <a:endParaRPr lang="en-US" dirty="0" smtClean="0"/>
+          </a:p>
+          <a:p>
+            <a:endParaRPr lang="en-US" dirty="0"/>
+          </a:p>
+        </p:txBody>
+      </p:sp>
+      <p:sp>
+        <p:nvSpPr>
+          <p:cNvPr id="4" name="Content Placeholder 3"/>
+          <p:cNvSpPr>
+            <a:spLocks noGrp="1"/>
+          </p:cNvSpPr>
+          <p:nvPr>
+            <p:ph sz="half" idx="2"/>
+          </p:nvPr>
+        </p:nvSpPr>
+        <p:spPr/>
+        <p:txBody>
+          <a:bodyPr/>
+          <a:lstStyle/>
+          <a:p>
+            <a:endParaRPr lang="en-US"/>
+          </a:p>
+        </p:txBody>
+      </p:sp>
+    </p:spTree>
+    <p:extLst>
+      <p:ext uri="{BB962C8B-B14F-4D97-AF65-F5344CB8AC3E}">
+        <p14:creationId xmlns:p14="http://schemas.microsoft.com/office/powerpoint/2010/main" val="2941407952"/>
+      </p:ext>
+    </p:extLst>
+  </p:cSld>
+  <p:clrMapOvr>
+    <a:masterClrMapping/>
+  </p:clrMapOvr>
+  <p:transition spd="slow">
+    <p:wipe/>
+  </p:transition>
+</p:sld>
+</file>
+
+<file path=ppt/slides/slide48.xml><?xml version="1.0" encoding="utf-8"?>
+<p:sld xmlns:a="http://schemas.openxmlformats.org/drawingml/2006/main" xmlns:r="http://schemas.openxmlformats.org/officeDocument/2006/relationships" xmlns:p="http://schemas.openxmlformats.org/presentationml/2006/main">
+  <p:cSld>
+    <p:spTree>
+      <p:nvGrpSpPr>
+        <p:cNvPr id="1" name=""/>
+        <p:cNvGrpSpPr/>
+        <p:nvPr/>
+      </p:nvGrpSpPr>
+      <p:grpSpPr>
+        <a:xfrm>
+          <a:off x="0" y="0"/>
+          <a:ext cx="0" cy="0"/>
+          <a:chOff x="0" y="0"/>
+          <a:chExt cx="0" cy="0"/>
+        </a:xfrm>
+      </p:grpSpPr>
+      <p:sp>
+        <p:nvSpPr>
           <p:cNvPr id="4" name="Title 3"/>
           <p:cNvSpPr>
             <a:spLocks noGrp="1"/>
@@ -30617,7 +31056,7 @@
 </p:sld>
 </file>
 
-<file path=ppt/slides/slide47.xml><?xml version="1.0" encoding="utf-8"?>
+<file path=ppt/slides/slide49.xml><?xml version="1.0" encoding="utf-8"?>
 <p:sld xmlns:a="http://schemas.openxmlformats.org/drawingml/2006/main" xmlns:r="http://schemas.openxmlformats.org/officeDocument/2006/relationships" xmlns:p="http://schemas.openxmlformats.org/presentationml/2006/main">
   <p:cSld>
     <p:spTree>
@@ -30719,240 +31158,6 @@
 </p:sld>
 </file>
 
-<file path=ppt/slides/slide48.xml><?xml version="1.0" encoding="utf-8"?>
-<p:sld xmlns:a="http://schemas.openxmlformats.org/drawingml/2006/main" xmlns:r="http://schemas.openxmlformats.org/officeDocument/2006/relationships" xmlns:p="http://schemas.openxmlformats.org/presentationml/2006/main">
-  <p:cSld>
-    <p:spTree>
-      <p:nvGrpSpPr>
-        <p:cNvPr id="1" name=""/>
-        <p:cNvGrpSpPr/>
-        <p:nvPr/>
-      </p:nvGrpSpPr>
-      <p:grpSpPr>
-        <a:xfrm>
-          <a:off x="0" y="0"/>
-          <a:ext cx="0" cy="0"/>
-          <a:chOff x="0" y="0"/>
-          <a:chExt cx="0" cy="0"/>
-        </a:xfrm>
-      </p:grpSpPr>
-      <p:sp>
-        <p:nvSpPr>
-          <p:cNvPr id="2" name="Title 1"/>
-          <p:cNvSpPr>
-            <a:spLocks noGrp="1"/>
-          </p:cNvSpPr>
-          <p:nvPr>
-            <p:ph type="title"/>
-          </p:nvPr>
-        </p:nvSpPr>
-        <p:spPr/>
-        <p:txBody>
-          <a:bodyPr>
-            <a:normAutofit/>
-          </a:bodyPr>
-          <a:lstStyle/>
-          <a:p>
-            <a:r>
-              <a:rPr lang="en-US" sz="5400" b="1" dirty="0" smtClean="0"/>
-              <a:t>IELTS Speaking Marking Criteria</a:t>
-            </a:r>
-            <a:endParaRPr lang="en-US" sz="5400" b="1" dirty="0"/>
-          </a:p>
-        </p:txBody>
-      </p:sp>
-      <p:sp>
-        <p:nvSpPr>
-          <p:cNvPr id="3" name="Content Placeholder 2"/>
-          <p:cNvSpPr>
-            <a:spLocks noGrp="1"/>
-          </p:cNvSpPr>
-          <p:nvPr>
-            <p:ph idx="1"/>
-          </p:nvPr>
-        </p:nvSpPr>
-        <p:spPr/>
-        <p:txBody>
-          <a:bodyPr>
-            <a:normAutofit/>
-          </a:bodyPr>
-          <a:lstStyle/>
-          <a:p>
-            <a:pPr marL="514350" indent="-514350">
-              <a:buFont typeface="+mj-lt"/>
-              <a:buAutoNum type="arabicPeriod"/>
-            </a:pPr>
-            <a:r>
-              <a:rPr lang="en-US" sz="6000" dirty="0" smtClean="0"/>
-              <a:t>Fluency &amp; Coherence</a:t>
-            </a:r>
-          </a:p>
-          <a:p>
-            <a:pPr marL="514350" indent="-514350">
-              <a:buFont typeface="+mj-lt"/>
-              <a:buAutoNum type="arabicPeriod"/>
-            </a:pPr>
-            <a:r>
-              <a:rPr lang="en-US" sz="6000" dirty="0" smtClean="0"/>
-              <a:t>Vocabulary</a:t>
-            </a:r>
-          </a:p>
-          <a:p>
-            <a:pPr marL="514350" indent="-514350">
-              <a:buFont typeface="+mj-lt"/>
-              <a:buAutoNum type="arabicPeriod"/>
-            </a:pPr>
-            <a:r>
-              <a:rPr lang="en-US" sz="6000" dirty="0" smtClean="0"/>
-              <a:t>Grammar</a:t>
-            </a:r>
-          </a:p>
-          <a:p>
-            <a:pPr marL="514350" indent="-514350">
-              <a:buFont typeface="+mj-lt"/>
-              <a:buAutoNum type="arabicPeriod"/>
-            </a:pPr>
-            <a:r>
-              <a:rPr lang="en-US" sz="6000" dirty="0" smtClean="0"/>
-              <a:t>Pronunciation</a:t>
-            </a:r>
-            <a:endParaRPr lang="en-US" sz="6000" dirty="0"/>
-          </a:p>
-        </p:txBody>
-      </p:sp>
-    </p:spTree>
-    <p:extLst>
-      <p:ext uri="{BB962C8B-B14F-4D97-AF65-F5344CB8AC3E}">
-        <p14:creationId xmlns:p14="http://schemas.microsoft.com/office/powerpoint/2010/main" val="938572514"/>
-      </p:ext>
-    </p:extLst>
-  </p:cSld>
-  <p:clrMapOvr>
-    <a:masterClrMapping/>
-  </p:clrMapOvr>
-  <p:transition spd="slow">
-    <p:wipe/>
-  </p:transition>
-  <p:timing>
-    <p:tnLst>
-      <p:par>
-        <p:cTn id="1" dur="indefinite" restart="never" nodeType="tmRoot"/>
-      </p:par>
-    </p:tnLst>
-  </p:timing>
-</p:sld>
-</file>
-
-<file path=ppt/slides/slide49.xml><?xml version="1.0" encoding="utf-8"?>
-<p:sld xmlns:a="http://schemas.openxmlformats.org/drawingml/2006/main" xmlns:r="http://schemas.openxmlformats.org/officeDocument/2006/relationships" xmlns:p="http://schemas.openxmlformats.org/presentationml/2006/main">
-  <p:cSld>
-    <p:spTree>
-      <p:nvGrpSpPr>
-        <p:cNvPr id="1" name=""/>
-        <p:cNvGrpSpPr/>
-        <p:nvPr/>
-      </p:nvGrpSpPr>
-      <p:grpSpPr>
-        <a:xfrm>
-          <a:off x="0" y="0"/>
-          <a:ext cx="0" cy="0"/>
-          <a:chOff x="0" y="0"/>
-          <a:chExt cx="0" cy="0"/>
-        </a:xfrm>
-      </p:grpSpPr>
-      <p:sp>
-        <p:nvSpPr>
-          <p:cNvPr id="4" name="Title 3"/>
-          <p:cNvSpPr>
-            <a:spLocks noGrp="1"/>
-          </p:cNvSpPr>
-          <p:nvPr>
-            <p:ph type="ctrTitle"/>
-          </p:nvPr>
-        </p:nvSpPr>
-        <p:spPr>
-          <a:xfrm>
-            <a:off x="1524000" y="2268775"/>
-            <a:ext cx="9144000" cy="2387600"/>
-          </a:xfrm>
-        </p:spPr>
-        <p:txBody>
-          <a:bodyPr>
-            <a:noAutofit/>
-          </a:bodyPr>
-          <a:lstStyle/>
-          <a:p>
-            <a:r>
-              <a:rPr lang="en-US" sz="11500" b="1" dirty="0" smtClean="0"/>
-              <a:t>Fluency &amp; </a:t>
-            </a:r>
-            <a:r>
-              <a:rPr lang="en-US" sz="11500" b="1" i="1" dirty="0" smtClean="0"/>
-              <a:t>Coherence</a:t>
-            </a:r>
-            <a:endParaRPr lang="en-US" sz="11500" b="1" i="1" dirty="0"/>
-          </a:p>
-        </p:txBody>
-      </p:sp>
-      <p:sp>
-        <p:nvSpPr>
-          <p:cNvPr id="5" name="Subtitle 4"/>
-          <p:cNvSpPr>
-            <a:spLocks noGrp="1"/>
-          </p:cNvSpPr>
-          <p:nvPr>
-            <p:ph type="subTitle" idx="1"/>
-          </p:nvPr>
-        </p:nvSpPr>
-        <p:spPr>
-          <a:xfrm>
-            <a:off x="1524000" y="4557381"/>
-            <a:ext cx="9144000" cy="1655762"/>
-          </a:xfrm>
-        </p:spPr>
-        <p:txBody>
-          <a:bodyPr/>
-          <a:lstStyle/>
-          <a:p>
-            <a:r>
-              <a:rPr lang="en-US" dirty="0" smtClean="0"/>
-              <a:t>IELTS Speaking Marking Criteria </a:t>
-            </a:r>
-            <a:r>
-              <a:rPr lang="en-US" sz="6000" b="1" dirty="0" smtClean="0">
-                <a:solidFill>
-                  <a:srgbClr val="FF0000"/>
-                </a:solidFill>
-              </a:rPr>
-              <a:t>1</a:t>
-            </a:r>
-            <a:endParaRPr lang="en-US" dirty="0"/>
-          </a:p>
-        </p:txBody>
-      </p:sp>
-    </p:spTree>
-    <p:extLst>
-      <p:ext uri="{BB962C8B-B14F-4D97-AF65-F5344CB8AC3E}">
-        <p14:creationId xmlns:p14="http://schemas.microsoft.com/office/powerpoint/2010/main" val="2918599252"/>
-      </p:ext>
-    </p:extLst>
-  </p:cSld>
-  <p:clrMapOvr>
-    <a:masterClrMapping/>
-  </p:clrMapOvr>
-  <p:transition spd="slow">
-    <p:wipe/>
-  </p:transition>
-  <p:timing>
-    <p:tnLst>
-      <p:par>
-        <p:cTn id="1" dur="indefinite" restart="never" nodeType="tmRoot"/>
-      </p:par>
-    </p:tnLst>
-  </p:timing>
-</p:sld>
-</file>
-
 <file path=ppt/slides/slide5.xml><?xml version="1.0" encoding="utf-8"?>
 <p:sld xmlns:a="http://schemas.openxmlformats.org/drawingml/2006/main" xmlns:r="http://schemas.openxmlformats.org/officeDocument/2006/relationships" xmlns:p="http://schemas.openxmlformats.org/presentationml/2006/main">
   <p:cSld>
@@ -31070,7 +31275,7 @@
       </p:grpSpPr>
       <p:sp>
         <p:nvSpPr>
-          <p:cNvPr id="4" name="Title 3"/>
+          <p:cNvPr id="2" name="Title 1"/>
           <p:cNvSpPr>
             <a:spLocks noGrp="1"/>
           </p:cNvSpPr>
@@ -31080,59 +31285,82 @@
         </p:nvSpPr>
         <p:spPr/>
         <p:txBody>
-          <a:bodyPr/>
+          <a:bodyPr>
+            <a:normAutofit/>
+          </a:bodyPr>
           <a:lstStyle/>
           <a:p>
-            <a:endParaRPr lang="en-US"/>
+            <a:r>
+              <a:rPr lang="en-US" sz="5400" b="1" dirty="0" smtClean="0"/>
+              <a:t>IELTS Speaking Marking Criteria</a:t>
+            </a:r>
+            <a:endParaRPr lang="en-US" sz="5400" b="1" dirty="0"/>
           </a:p>
         </p:txBody>
       </p:sp>
       <p:sp>
         <p:nvSpPr>
-          <p:cNvPr id="5" name="Content Placeholder 4"/>
+          <p:cNvPr id="3" name="Content Placeholder 2"/>
           <p:cNvSpPr>
             <a:spLocks noGrp="1"/>
           </p:cNvSpPr>
           <p:nvPr>
-            <p:ph sz="half" idx="1"/>
+            <p:ph idx="1"/>
           </p:nvPr>
         </p:nvSpPr>
         <p:spPr/>
         <p:txBody>
-          <a:bodyPr/>
+          <a:bodyPr>
+            <a:normAutofit/>
+          </a:bodyPr>
           <a:lstStyle/>
           <a:p>
-            <a:r>
-              <a:rPr lang="en-US" dirty="0" smtClean="0"/>
-              <a:t>No blabbering</a:t>
-            </a:r>
-            <a:endParaRPr lang="en-US" dirty="0"/>
-          </a:p>
-        </p:txBody>
-      </p:sp>
-      <p:sp>
-        <p:nvSpPr>
-          <p:cNvPr id="6" name="Content Placeholder 5"/>
-          <p:cNvSpPr>
-            <a:spLocks noGrp="1"/>
-          </p:cNvSpPr>
-          <p:nvPr>
-            <p:ph sz="half" idx="2"/>
-          </p:nvPr>
-        </p:nvSpPr>
-        <p:spPr/>
-        <p:txBody>
-          <a:bodyPr/>
-          <a:lstStyle/>
-          <a:p>
-            <a:endParaRPr lang="en-US" dirty="0"/>
+            <a:pPr marL="514350" indent="-514350">
+              <a:buFont typeface="+mj-lt"/>
+              <a:buAutoNum type="arabicPeriod"/>
+            </a:pPr>
+            <a:r>
+              <a:rPr lang="en-US" sz="6000" dirty="0" smtClean="0"/>
+              <a:t>Fluency &amp; Coherence</a:t>
+            </a:r>
+          </a:p>
+          <a:p>
+            <a:pPr marL="514350" indent="-514350">
+              <a:buFont typeface="+mj-lt"/>
+              <a:buAutoNum type="arabicPeriod"/>
+            </a:pPr>
+            <a:r>
+              <a:rPr lang="en-US" sz="6000" dirty="0" smtClean="0"/>
+              <a:t>Vocabulary</a:t>
+            </a:r>
+          </a:p>
+          <a:p>
+            <a:pPr marL="514350" indent="-514350">
+              <a:buFont typeface="+mj-lt"/>
+              <a:buAutoNum type="arabicPeriod"/>
+            </a:pPr>
+            <a:r>
+              <a:rPr lang="en-US" sz="6000" dirty="0" smtClean="0"/>
+              <a:t>Grammar</a:t>
+            </a:r>
+          </a:p>
+          <a:p>
+            <a:pPr marL="514350" indent="-514350">
+              <a:buFont typeface="+mj-lt"/>
+              <a:buAutoNum type="arabicPeriod"/>
+            </a:pPr>
+            <a:r>
+              <a:rPr lang="en-US" sz="6000" dirty="0" smtClean="0"/>
+              <a:t>Pronunciation</a:t>
+            </a:r>
+            <a:endParaRPr lang="en-US" sz="6000" dirty="0"/>
           </a:p>
         </p:txBody>
       </p:sp>
     </p:spTree>
     <p:extLst>
       <p:ext uri="{BB962C8B-B14F-4D97-AF65-F5344CB8AC3E}">
-        <p14:creationId xmlns:p14="http://schemas.microsoft.com/office/powerpoint/2010/main" val="4254949145"/>
+        <p14:creationId xmlns:p14="http://schemas.microsoft.com/office/powerpoint/2010/main" val="938572514"/>
       </p:ext>
     </p:extLst>
   </p:cSld>
@@ -31142,6 +31370,13 @@
   <p:transition spd="slow">
     <p:wipe/>
   </p:transition>
+  <p:timing>
+    <p:tnLst>
+      <p:par>
+        <p:cTn id="1" dur="indefinite" restart="never" nodeType="tmRoot"/>
+      </p:par>
+    </p:tnLst>
+  </p:timing>
 </p:sld>
 </file>
 
@@ -31164,107 +31399,70 @@
       </p:grpSpPr>
       <p:sp>
         <p:nvSpPr>
-          <p:cNvPr id="2" name="Title 1"/>
+          <p:cNvPr id="4" name="Title 3"/>
           <p:cNvSpPr>
             <a:spLocks noGrp="1"/>
           </p:cNvSpPr>
           <p:nvPr>
-            <p:ph type="title"/>
+            <p:ph type="ctrTitle"/>
           </p:nvPr>
         </p:nvSpPr>
         <p:spPr>
           <a:xfrm>
-            <a:off x="600499" y="353112"/>
-            <a:ext cx="10959153" cy="1325563"/>
+            <a:off x="1524000" y="2268775"/>
+            <a:ext cx="9144000" cy="2387600"/>
           </a:xfrm>
         </p:spPr>
         <p:txBody>
           <a:bodyPr>
-            <a:normAutofit/>
+            <a:noAutofit/>
           </a:bodyPr>
           <a:lstStyle/>
           <a:p>
-            <a:pPr algn="ctr"/>
-            <a:r>
-              <a:rPr lang="en-US" sz="4800" b="1" dirty="0" smtClean="0">
-                <a:solidFill>
-                  <a:srgbClr val="7030A0"/>
-                </a:solidFill>
-              </a:rPr>
-              <a:t>Sample questions &amp; answers: </a:t>
-            </a:r>
-            <a:r>
-              <a:rPr lang="en-US" sz="2800" b="1" dirty="0" smtClean="0">
-                <a:solidFill>
-                  <a:srgbClr val="7030A0"/>
-                </a:solidFill>
-              </a:rPr>
-              <a:t>IELTS Speaking</a:t>
-            </a:r>
-            <a:endParaRPr lang="en-US" sz="4800" b="1" dirty="0">
-              <a:solidFill>
-                <a:srgbClr val="7030A0"/>
-              </a:solidFill>
-            </a:endParaRPr>
+            <a:r>
+              <a:rPr lang="en-US" sz="11500" b="1" dirty="0" smtClean="0"/>
+              <a:t>Fluency &amp; </a:t>
+            </a:r>
+            <a:r>
+              <a:rPr lang="en-US" sz="11500" b="1" i="1" dirty="0" smtClean="0"/>
+              <a:t>Coherence</a:t>
+            </a:r>
+            <a:endParaRPr lang="en-US" sz="11500" b="1" i="1" dirty="0"/>
           </a:p>
         </p:txBody>
       </p:sp>
       <p:sp>
         <p:nvSpPr>
-          <p:cNvPr id="3" name="Content Placeholder 2"/>
+          <p:cNvPr id="5" name="Subtitle 4"/>
           <p:cNvSpPr>
             <a:spLocks noGrp="1"/>
           </p:cNvSpPr>
           <p:nvPr>
-            <p:ph sz="half" idx="1"/>
+            <p:ph type="subTitle" idx="1"/>
           </p:nvPr>
         </p:nvSpPr>
         <p:spPr>
           <a:xfrm>
-            <a:off x="600501" y="1678675"/>
-            <a:ext cx="5181600" cy="4967784"/>
+            <a:off x="1524000" y="4557381"/>
+            <a:ext cx="9144000" cy="1655762"/>
           </a:xfrm>
         </p:spPr>
         <p:txBody>
           <a:bodyPr/>
           <a:lstStyle/>
           <a:p>
-            <a:pPr>
-              <a:buFont typeface="Wingdings" panose="05000000000000000000" pitchFamily="2" charset="2"/>
-              <a:buChar char="§"/>
-            </a:pPr>
             <a:r>
               <a:rPr lang="en-US" dirty="0" smtClean="0"/>
-              <a:t>No </a:t>
-            </a:r>
-            <a:endParaRPr lang="en-US" dirty="0" smtClean="0"/>
-          </a:p>
-        </p:txBody>
-      </p:sp>
-      <p:sp>
-        <p:nvSpPr>
-          <p:cNvPr id="4" name="Content Placeholder 3"/>
-          <p:cNvSpPr>
-            <a:spLocks noGrp="1"/>
-          </p:cNvSpPr>
-          <p:nvPr>
-            <p:ph sz="half" idx="2"/>
-          </p:nvPr>
-        </p:nvSpPr>
-        <p:spPr>
-          <a:xfrm>
-            <a:off x="6080076" y="1678675"/>
-            <a:ext cx="5479577" cy="4967783"/>
-          </a:xfrm>
-        </p:spPr>
-        <p:txBody>
-          <a:bodyPr/>
-          <a:lstStyle/>
-          <a:p>
-            <a:pPr>
-              <a:buFont typeface="Wingdings" panose="05000000000000000000" pitchFamily="2" charset="2"/>
-              <a:buChar char="§"/>
-            </a:pPr>
+              <a:t>IELTS Speaking Marking Criteria </a:t>
+            </a:r>
+            <a:r>
+              <a:rPr lang="en-US" sz="6000" b="1" dirty="0" smtClean="0">
+                <a:solidFill>
+                  <a:srgbClr val="FF0000"/>
+                </a:solidFill>
+              </a:rPr>
+              <a:t>1</a:t>
+            </a:r>
             <a:endParaRPr lang="en-US" dirty="0"/>
           </a:p>
         </p:txBody>
@@ -31272,7 +31470,7 @@
     </p:spTree>
     <p:extLst>
       <p:ext uri="{BB962C8B-B14F-4D97-AF65-F5344CB8AC3E}">
-        <p14:creationId xmlns:p14="http://schemas.microsoft.com/office/powerpoint/2010/main" val="4219860067"/>
+        <p14:creationId xmlns:p14="http://schemas.microsoft.com/office/powerpoint/2010/main" val="2918599252"/>
       </p:ext>
     </p:extLst>
   </p:cSld>
@@ -31311,7 +31509,7 @@
       </p:grpSpPr>
       <p:sp>
         <p:nvSpPr>
-          <p:cNvPr id="2" name="Title 1"/>
+          <p:cNvPr id="4" name="Title 3"/>
           <p:cNvSpPr>
             <a:spLocks noGrp="1"/>
           </p:cNvSpPr>
@@ -31319,68 +31517,12 @@
             <p:ph type="title"/>
           </p:nvPr>
         </p:nvSpPr>
-        <p:spPr>
-          <a:xfrm>
-            <a:off x="576775" y="365125"/>
-            <a:ext cx="11057207" cy="1325563"/>
-          </a:xfrm>
-        </p:spPr>
-        <p:txBody>
-          <a:bodyPr>
-            <a:normAutofit/>
-          </a:bodyPr>
-          <a:lstStyle/>
-          <a:p>
-            <a:pPr algn="ctr"/>
-            <a:r>
-              <a:rPr lang="en-US" b="1" dirty="0" smtClean="0"/>
-              <a:t>Sources</a:t>
-            </a:r>
-            <a:r>
-              <a:rPr lang="en-US" dirty="0" smtClean="0"/>
-              <a:t> to improve </a:t>
-            </a:r>
-            <a:r>
-              <a:rPr lang="en-US" b="1" dirty="0" smtClean="0">
-                <a:solidFill>
-                  <a:srgbClr val="FF0000"/>
-                </a:solidFill>
-              </a:rPr>
-              <a:t>Fluency</a:t>
-            </a:r>
-            <a:endParaRPr lang="en-US" b="1" dirty="0">
-              <a:solidFill>
-                <a:srgbClr val="FF0000"/>
-              </a:solidFill>
-            </a:endParaRPr>
-          </a:p>
-        </p:txBody>
-      </p:sp>
-      <p:sp>
-        <p:nvSpPr>
-          <p:cNvPr id="4" name="Content Placeholder 3"/>
-          <p:cNvSpPr>
-            <a:spLocks noGrp="1"/>
-          </p:cNvSpPr>
-          <p:nvPr>
-            <p:ph sz="half" idx="1"/>
-          </p:nvPr>
-        </p:nvSpPr>
-        <p:spPr>
-          <a:xfrm>
-            <a:off x="576775" y="1825625"/>
-            <a:ext cx="5443025" cy="4351338"/>
-          </a:xfrm>
-        </p:spPr>
+        <p:spPr/>
         <p:txBody>
           <a:bodyPr/>
           <a:lstStyle/>
           <a:p>
-            <a:pPr>
-              <a:buFont typeface="Wingdings" panose="05000000000000000000" pitchFamily="2" charset="2"/>
-              <a:buChar char="§"/>
-            </a:pPr>
-            <a:endParaRPr lang="en-US" dirty="0"/>
+            <a:endParaRPr lang="en-US"/>
           </a:p>
         </p:txBody>
       </p:sp>
@@ -31391,27 +31533,37 @@
             <a:spLocks noGrp="1"/>
           </p:cNvSpPr>
           <p:nvPr>
+            <p:ph sz="half" idx="1"/>
+          </p:nvPr>
+        </p:nvSpPr>
+        <p:spPr/>
+        <p:txBody>
+          <a:bodyPr/>
+          <a:lstStyle/>
+          <a:p>
+            <a:r>
+              <a:rPr lang="en-US" dirty="0" smtClean="0"/>
+              <a:t>No blabbering</a:t>
+            </a:r>
+            <a:endParaRPr lang="en-US" dirty="0"/>
+          </a:p>
+        </p:txBody>
+      </p:sp>
+      <p:sp>
+        <p:nvSpPr>
+          <p:cNvPr id="6" name="Content Placeholder 5"/>
+          <p:cNvSpPr>
+            <a:spLocks noGrp="1"/>
+          </p:cNvSpPr>
+          <p:nvPr>
             <p:ph sz="half" idx="2"/>
           </p:nvPr>
         </p:nvSpPr>
-        <p:spPr>
-          <a:xfrm>
-            <a:off x="6172200" y="1825625"/>
-            <a:ext cx="5461782" cy="4351338"/>
-          </a:xfrm>
-        </p:spPr>
+        <p:spPr/>
         <p:txBody>
           <a:bodyPr/>
           <a:lstStyle/>
           <a:p>
-            <a:pPr>
-              <a:buFont typeface="Wingdings" panose="05000000000000000000" pitchFamily="2" charset="2"/>
-              <a:buChar char="§"/>
-            </a:pPr>
-            <a:r>
-              <a:rPr lang="en-US" dirty="0"/>
-              <a:t>https://www.youtube.com/watch?v=F1eHaRg_UyE</a:t>
-            </a:r>
             <a:endParaRPr lang="en-US" dirty="0"/>
           </a:p>
         </p:txBody>
@@ -31419,7 +31571,7 @@
     </p:spTree>
     <p:extLst>
       <p:ext uri="{BB962C8B-B14F-4D97-AF65-F5344CB8AC3E}">
-        <p14:creationId xmlns:p14="http://schemas.microsoft.com/office/powerpoint/2010/main" val="2507471195"/>
+        <p14:creationId xmlns:p14="http://schemas.microsoft.com/office/powerpoint/2010/main" val="4254949145"/>
       </p:ext>
     </p:extLst>
   </p:cSld>
@@ -31429,13 +31581,6 @@
   <p:transition spd="slow">
     <p:wipe/>
   </p:transition>
-  <p:timing>
-    <p:tnLst>
-      <p:par>
-        <p:cTn id="1" dur="indefinite" restart="never" nodeType="tmRoot"/>
-      </p:par>
-    </p:tnLst>
-  </p:timing>
 </p:sld>
 </file>
 
@@ -31458,64 +31603,106 @@
       </p:grpSpPr>
       <p:sp>
         <p:nvSpPr>
-          <p:cNvPr id="4" name="Title 3"/>
+          <p:cNvPr id="2" name="Title 1"/>
           <p:cNvSpPr>
             <a:spLocks noGrp="1"/>
           </p:cNvSpPr>
           <p:nvPr>
-            <p:ph type="ctrTitle"/>
+            <p:ph type="title"/>
           </p:nvPr>
         </p:nvSpPr>
-        <p:spPr/>
+        <p:spPr>
+          <a:xfrm>
+            <a:off x="600499" y="353112"/>
+            <a:ext cx="10959153" cy="1325563"/>
+          </a:xfrm>
+        </p:spPr>
         <p:txBody>
           <a:bodyPr>
-            <a:normAutofit fontScale="90000"/>
+            <a:normAutofit/>
           </a:bodyPr>
           <a:lstStyle/>
           <a:p>
-            <a:r>
-              <a:rPr lang="en-US" sz="8000" dirty="0" smtClean="0"/>
-              <a:t>Lexical Resources (</a:t>
-            </a:r>
-            <a:r>
-              <a:rPr lang="en-US" sz="12800" b="1" dirty="0" smtClean="0"/>
-              <a:t>Vocabulary</a:t>
-            </a:r>
-            <a:r>
-              <a:rPr lang="en-US" sz="8000" dirty="0" smtClean="0"/>
-              <a:t>)</a:t>
-            </a:r>
-            <a:endParaRPr lang="en-US" sz="8000" dirty="0"/>
+            <a:pPr algn="ctr"/>
+            <a:r>
+              <a:rPr lang="en-US" sz="4800" b="1" dirty="0" smtClean="0">
+                <a:solidFill>
+                  <a:srgbClr val="7030A0"/>
+                </a:solidFill>
+              </a:rPr>
+              <a:t>Sample questions &amp; answers: </a:t>
+            </a:r>
+            <a:r>
+              <a:rPr lang="en-US" sz="2800" b="1" dirty="0" smtClean="0">
+                <a:solidFill>
+                  <a:srgbClr val="7030A0"/>
+                </a:solidFill>
+              </a:rPr>
+              <a:t>IELTS Speaking</a:t>
+            </a:r>
+            <a:endParaRPr lang="en-US" sz="4800" b="1" dirty="0">
+              <a:solidFill>
+                <a:srgbClr val="7030A0"/>
+              </a:solidFill>
+            </a:endParaRPr>
           </a:p>
         </p:txBody>
       </p:sp>
       <p:sp>
         <p:nvSpPr>
-          <p:cNvPr id="5" name="Subtitle 4"/>
+          <p:cNvPr id="3" name="Content Placeholder 2"/>
           <p:cNvSpPr>
             <a:spLocks noGrp="1"/>
           </p:cNvSpPr>
           <p:nvPr>
-            <p:ph type="subTitle" idx="1"/>
+            <p:ph sz="half" idx="1"/>
           </p:nvPr>
         </p:nvSpPr>
-        <p:spPr/>
+        <p:spPr>
+          <a:xfrm>
+            <a:off x="600501" y="1678675"/>
+            <a:ext cx="5181600" cy="4967784"/>
+          </a:xfrm>
+        </p:spPr>
         <p:txBody>
           <a:bodyPr/>
           <a:lstStyle/>
           <a:p>
+            <a:pPr>
+              <a:buFont typeface="Wingdings" panose="05000000000000000000" pitchFamily="2" charset="2"/>
+              <a:buChar char="§"/>
+            </a:pPr>
             <a:r>
               <a:rPr lang="en-US" dirty="0" smtClean="0"/>
-              <a:t>IELTS Speaking Marking Criteria </a:t>
-            </a:r>
-            <a:r>
-              <a:rPr lang="en-US" sz="6000" b="1" dirty="0" smtClean="0">
-                <a:solidFill>
-                  <a:srgbClr val="FF0000"/>
-                </a:solidFill>
-              </a:rPr>
-              <a:t>2</a:t>
-            </a:r>
+              <a:t>No </a:t>
+            </a:r>
+          </a:p>
+        </p:txBody>
+      </p:sp>
+      <p:sp>
+        <p:nvSpPr>
+          <p:cNvPr id="4" name="Content Placeholder 3"/>
+          <p:cNvSpPr>
+            <a:spLocks noGrp="1"/>
+          </p:cNvSpPr>
+          <p:nvPr>
+            <p:ph sz="half" idx="2"/>
+          </p:nvPr>
+        </p:nvSpPr>
+        <p:spPr>
+          <a:xfrm>
+            <a:off x="6080076" y="1678675"/>
+            <a:ext cx="5479577" cy="4967783"/>
+          </a:xfrm>
+        </p:spPr>
+        <p:txBody>
+          <a:bodyPr/>
+          <a:lstStyle/>
+          <a:p>
+            <a:pPr>
+              <a:buFont typeface="Wingdings" panose="05000000000000000000" pitchFamily="2" charset="2"/>
+              <a:buChar char="§"/>
+            </a:pPr>
             <a:endParaRPr lang="en-US" dirty="0"/>
           </a:p>
         </p:txBody>
@@ -31523,7 +31710,7 @@
     </p:spTree>
     <p:extLst>
       <p:ext uri="{BB962C8B-B14F-4D97-AF65-F5344CB8AC3E}">
-        <p14:creationId xmlns:p14="http://schemas.microsoft.com/office/powerpoint/2010/main" val="2761817810"/>
+        <p14:creationId xmlns:p14="http://schemas.microsoft.com/office/powerpoint/2010/main" val="4219860067"/>
       </p:ext>
     </p:extLst>
   </p:cSld>
@@ -31572,8 +31759,8 @@
         </p:nvSpPr>
         <p:spPr>
           <a:xfrm>
-            <a:off x="600499" y="353112"/>
-            <a:ext cx="10959153" cy="1325563"/>
+            <a:off x="576775" y="365125"/>
+            <a:ext cx="11057207" cy="1325563"/>
           </a:xfrm>
         </p:spPr>
         <p:txBody>
@@ -31584,24 +31771,24 @@
           <a:p>
             <a:pPr algn="ctr"/>
             <a:r>
-              <a:rPr lang="en-US" sz="4800" b="1" dirty="0" smtClean="0">
+              <a:rPr lang="en-US" b="1" dirty="0" smtClean="0"/>
+              <a:t>Sources</a:t>
+            </a:r>
+            <a:r>
+              <a:rPr lang="en-US" dirty="0" smtClean="0"/>
+              <a:t> to improve </a:t>
+            </a:r>
+            <a:r>
+              <a:rPr lang="en-US" b="1" dirty="0" smtClean="0">
                 <a:solidFill>
-                  <a:srgbClr val="7030A0"/>
+                  <a:srgbClr val="FF0000"/>
                 </a:solidFill>
               </a:rPr>
-              <a:t>Sample questions &amp; answers: </a:t>
-            </a:r>
-            <a:r>
-              <a:rPr lang="en-US" sz="2800" b="1" dirty="0" smtClean="0">
-                <a:solidFill>
-                  <a:srgbClr val="7030A0"/>
-                </a:solidFill>
-              </a:rPr>
-              <a:t>IELTS Speaking</a:t>
-            </a:r>
-            <a:endParaRPr lang="en-US" sz="4800" b="1" dirty="0">
+              <a:t>Fluency</a:t>
+            </a:r>
+            <a:endParaRPr lang="en-US" b="1" dirty="0">
               <a:solidFill>
-                <a:srgbClr val="7030A0"/>
+                <a:srgbClr val="FF0000"/>
               </a:solidFill>
             </a:endParaRPr>
           </a:p>
@@ -31609,7 +31796,7 @@
       </p:sp>
       <p:sp>
         <p:nvSpPr>
-          <p:cNvPr id="3" name="Content Placeholder 2"/>
+          <p:cNvPr id="4" name="Content Placeholder 3"/>
           <p:cNvSpPr>
             <a:spLocks noGrp="1"/>
           </p:cNvSpPr>
@@ -31619,8 +31806,8 @@
         </p:nvSpPr>
         <p:spPr>
           <a:xfrm>
-            <a:off x="600501" y="1678675"/>
-            <a:ext cx="5181600" cy="4967784"/>
+            <a:off x="576775" y="1825625"/>
+            <a:ext cx="5443025" cy="4351338"/>
           </a:xfrm>
         </p:spPr>
         <p:txBody>
@@ -31631,13 +31818,13 @@
               <a:buFont typeface="Wingdings" panose="05000000000000000000" pitchFamily="2" charset="2"/>
               <a:buChar char="§"/>
             </a:pPr>
-            <a:endParaRPr lang="en-US" dirty="0" smtClean="0"/>
+            <a:endParaRPr lang="en-US" dirty="0"/>
           </a:p>
         </p:txBody>
       </p:sp>
       <p:sp>
         <p:nvSpPr>
-          <p:cNvPr id="4" name="Content Placeholder 3"/>
+          <p:cNvPr id="5" name="Content Placeholder 4"/>
           <p:cNvSpPr>
             <a:spLocks noGrp="1"/>
           </p:cNvSpPr>
@@ -31647,8 +31834,8 @@
         </p:nvSpPr>
         <p:spPr>
           <a:xfrm>
-            <a:off x="6080076" y="1678675"/>
-            <a:ext cx="5479577" cy="4967783"/>
+            <a:off x="6172200" y="1825625"/>
+            <a:ext cx="5461782" cy="4351338"/>
           </a:xfrm>
         </p:spPr>
         <p:txBody>
@@ -31659,14 +31846,17 @@
               <a:buFont typeface="Wingdings" panose="05000000000000000000" pitchFamily="2" charset="2"/>
               <a:buChar char="§"/>
             </a:pPr>
-            <a:endParaRPr lang="en-US" dirty="0"/>
+            <a:r>
+              <a:rPr lang="en-US" dirty="0"/>
+              <a:t>https://www.youtube.com/watch?v=F1eHaRg_UyE</a:t>
+            </a:r>
           </a:p>
         </p:txBody>
       </p:sp>
     </p:spTree>
     <p:extLst>
       <p:ext uri="{BB962C8B-B14F-4D97-AF65-F5344CB8AC3E}">
-        <p14:creationId xmlns:p14="http://schemas.microsoft.com/office/powerpoint/2010/main" val="1454329666"/>
+        <p14:creationId xmlns:p14="http://schemas.microsoft.com/office/powerpoint/2010/main" val="2507471195"/>
       </p:ext>
     </p:extLst>
   </p:cSld>
@@ -31705,197 +31895,64 @@
       </p:grpSpPr>
       <p:sp>
         <p:nvSpPr>
-          <p:cNvPr id="2" name="Title 1"/>
+          <p:cNvPr id="4" name="Title 3"/>
           <p:cNvSpPr>
             <a:spLocks noGrp="1"/>
           </p:cNvSpPr>
           <p:nvPr>
-            <p:ph type="title"/>
+            <p:ph type="ctrTitle"/>
           </p:nvPr>
         </p:nvSpPr>
-        <p:spPr>
-          <a:xfrm>
-            <a:off x="839788" y="0"/>
-            <a:ext cx="10515600" cy="1325563"/>
-          </a:xfrm>
-        </p:spPr>
+        <p:spPr/>
         <p:txBody>
           <a:bodyPr>
-            <a:normAutofit/>
+            <a:normAutofit fontScale="90000"/>
           </a:bodyPr>
           <a:lstStyle/>
           <a:p>
-            <a:pPr algn="ctr"/>
-            <a:r>
-              <a:rPr lang="en-US" b="1" dirty="0" smtClean="0"/>
-              <a:t>Sources</a:t>
-            </a:r>
+            <a:r>
+              <a:rPr lang="en-US" sz="8000" dirty="0" smtClean="0"/>
+              <a:t>Lexical Resources (</a:t>
+            </a:r>
+            <a:r>
+              <a:rPr lang="en-US" sz="12800" b="1" dirty="0" smtClean="0"/>
+              <a:t>Vocabulary</a:t>
+            </a:r>
+            <a:r>
+              <a:rPr lang="en-US" sz="8000" dirty="0" smtClean="0"/>
+              <a:t>)</a:t>
+            </a:r>
+            <a:endParaRPr lang="en-US" sz="8000" dirty="0"/>
+          </a:p>
+        </p:txBody>
+      </p:sp>
+      <p:sp>
+        <p:nvSpPr>
+          <p:cNvPr id="5" name="Subtitle 4"/>
+          <p:cNvSpPr>
+            <a:spLocks noGrp="1"/>
+          </p:cNvSpPr>
+          <p:nvPr>
+            <p:ph type="subTitle" idx="1"/>
+          </p:nvPr>
+        </p:nvSpPr>
+        <p:spPr/>
+        <p:txBody>
+          <a:bodyPr/>
+          <a:lstStyle/>
+          <a:p>
             <a:r>
               <a:rPr lang="en-US" dirty="0" smtClean="0"/>
-              <a:t> to improve </a:t>
-            </a:r>
-            <a:r>
-              <a:rPr lang="en-US" b="1" dirty="0" err="1" smtClean="0">
+              <a:t>IELTS Speaking Marking Criteria </a:t>
+            </a:r>
+            <a:r>
+              <a:rPr lang="en-US" sz="6000" b="1" dirty="0" smtClean="0">
                 <a:solidFill>
                   <a:srgbClr val="FF0000"/>
                 </a:solidFill>
               </a:rPr>
-              <a:t>VocaB</a:t>
-            </a:r>
-            <a:endParaRPr lang="en-US" b="1" dirty="0">
-              <a:solidFill>
-                <a:srgbClr val="FF0000"/>
-              </a:solidFill>
-            </a:endParaRPr>
-          </a:p>
-        </p:txBody>
-      </p:sp>
-      <p:sp>
-        <p:nvSpPr>
-          <p:cNvPr id="3" name="Text Placeholder 2"/>
-          <p:cNvSpPr>
-            <a:spLocks noGrp="1"/>
-          </p:cNvSpPr>
-          <p:nvPr>
-            <p:ph type="body" idx="1"/>
-          </p:nvPr>
-        </p:nvSpPr>
-        <p:spPr>
-          <a:xfrm>
-            <a:off x="839788" y="913607"/>
-            <a:ext cx="5157787" cy="823912"/>
-          </a:xfrm>
-        </p:spPr>
-        <p:txBody>
-          <a:bodyPr>
-            <a:noAutofit/>
-          </a:bodyPr>
-          <a:lstStyle/>
-          <a:p>
-            <a:r>
-              <a:rPr lang="en-US" sz="5400" dirty="0" smtClean="0">
-                <a:solidFill>
-                  <a:srgbClr val="7030A0"/>
-                </a:solidFill>
-              </a:rPr>
-              <a:t>Book</a:t>
-            </a:r>
-            <a:endParaRPr lang="en-US" sz="5400" dirty="0">
-              <a:solidFill>
-                <a:srgbClr val="7030A0"/>
-              </a:solidFill>
-            </a:endParaRPr>
-          </a:p>
-        </p:txBody>
-      </p:sp>
-      <p:sp>
-        <p:nvSpPr>
-          <p:cNvPr id="6" name="Content Placeholder 5"/>
-          <p:cNvSpPr>
-            <a:spLocks noGrp="1"/>
-          </p:cNvSpPr>
-          <p:nvPr>
-            <p:ph sz="half" idx="2"/>
-          </p:nvPr>
-        </p:nvSpPr>
-        <p:spPr>
-          <a:xfrm>
-            <a:off x="927100" y="1737519"/>
-            <a:ext cx="5157787" cy="3684588"/>
-          </a:xfrm>
-        </p:spPr>
-        <p:txBody>
-          <a:bodyPr/>
-          <a:lstStyle/>
-          <a:p>
-            <a:pPr>
-              <a:buFont typeface="Wingdings" panose="05000000000000000000" pitchFamily="2" charset="2"/>
-              <a:buChar char="§"/>
-            </a:pPr>
-            <a:r>
-              <a:rPr lang="en-US" dirty="0" smtClean="0"/>
-              <a:t>IELTS Band 9 </a:t>
-            </a:r>
-            <a:r>
-              <a:rPr lang="en-US" dirty="0" err="1" smtClean="0"/>
-              <a:t>VocaB</a:t>
-            </a:r>
-            <a:r>
-              <a:rPr lang="en-US" dirty="0" smtClean="0"/>
-              <a:t> secret</a:t>
-            </a:r>
-          </a:p>
-          <a:p>
-            <a:pPr>
-              <a:buFont typeface="Wingdings" panose="05000000000000000000" pitchFamily="2" charset="2"/>
-              <a:buChar char="§"/>
-            </a:pPr>
-            <a:endParaRPr lang="en-US" dirty="0"/>
-          </a:p>
-        </p:txBody>
-      </p:sp>
-      <p:sp>
-        <p:nvSpPr>
-          <p:cNvPr id="7" name="Text Placeholder 6"/>
-          <p:cNvSpPr>
-            <a:spLocks noGrp="1"/>
-          </p:cNvSpPr>
-          <p:nvPr>
-            <p:ph type="body" sz="quarter" idx="3"/>
-          </p:nvPr>
-        </p:nvSpPr>
-        <p:spPr>
-          <a:xfrm>
-            <a:off x="6172200" y="913607"/>
-            <a:ext cx="5183188" cy="823912"/>
-          </a:xfrm>
-        </p:spPr>
-        <p:txBody>
-          <a:bodyPr>
-            <a:normAutofit/>
-          </a:bodyPr>
-          <a:lstStyle/>
-          <a:p>
-            <a:r>
-              <a:rPr lang="en-US" sz="4800" dirty="0" smtClean="0">
-                <a:solidFill>
-                  <a:srgbClr val="7030A0"/>
-                </a:solidFill>
-              </a:rPr>
-              <a:t>Website</a:t>
-            </a:r>
-            <a:endParaRPr lang="en-US" sz="4800" dirty="0">
-              <a:solidFill>
-                <a:srgbClr val="7030A0"/>
-              </a:solidFill>
-            </a:endParaRPr>
-          </a:p>
-        </p:txBody>
-      </p:sp>
-      <p:sp>
-        <p:nvSpPr>
-          <p:cNvPr id="8" name="Content Placeholder 7"/>
-          <p:cNvSpPr>
-            <a:spLocks noGrp="1"/>
-          </p:cNvSpPr>
-          <p:nvPr>
-            <p:ph sz="quarter" idx="4"/>
-          </p:nvPr>
-        </p:nvSpPr>
-        <p:spPr>
-          <a:xfrm>
-            <a:off x="6172200" y="1737519"/>
-            <a:ext cx="5183188" cy="3684588"/>
-          </a:xfrm>
-        </p:spPr>
-        <p:txBody>
-          <a:bodyPr/>
-          <a:lstStyle/>
-          <a:p>
-            <a:pPr>
-              <a:buFont typeface="Wingdings" panose="05000000000000000000" pitchFamily="2" charset="2"/>
-              <a:buChar char="§"/>
-            </a:pPr>
+              <a:t>2</a:t>
+            </a:r>
             <a:endParaRPr lang="en-US" dirty="0"/>
           </a:p>
         </p:txBody>
@@ -31903,7 +31960,7 @@
     </p:spTree>
     <p:extLst>
       <p:ext uri="{BB962C8B-B14F-4D97-AF65-F5344CB8AC3E}">
-        <p14:creationId xmlns:p14="http://schemas.microsoft.com/office/powerpoint/2010/main" val="16853066"/>
+        <p14:creationId xmlns:p14="http://schemas.microsoft.com/office/powerpoint/2010/main" val="2761817810"/>
       </p:ext>
     </p:extLst>
   </p:cSld>
@@ -31942,61 +31999,103 @@
       </p:grpSpPr>
       <p:sp>
         <p:nvSpPr>
-          <p:cNvPr id="4" name="Title 3"/>
+          <p:cNvPr id="2" name="Title 1"/>
           <p:cNvSpPr>
             <a:spLocks noGrp="1"/>
           </p:cNvSpPr>
           <p:nvPr>
-            <p:ph type="ctrTitle"/>
+            <p:ph type="title"/>
           </p:nvPr>
         </p:nvSpPr>
-        <p:spPr/>
+        <p:spPr>
+          <a:xfrm>
+            <a:off x="600499" y="353112"/>
+            <a:ext cx="10959153" cy="1325563"/>
+          </a:xfrm>
+        </p:spPr>
         <p:txBody>
           <a:bodyPr>
-            <a:noAutofit/>
+            <a:normAutofit/>
           </a:bodyPr>
           <a:lstStyle/>
           <a:p>
-            <a:r>
-              <a:rPr lang="en-US" sz="8000" b="1" dirty="0" smtClean="0"/>
-              <a:t>Grammatical Range &amp; Accuracy</a:t>
-            </a:r>
-            <a:endParaRPr lang="en-US" sz="8000" b="1" dirty="0"/>
+            <a:pPr algn="ctr"/>
+            <a:r>
+              <a:rPr lang="en-US" sz="4800" b="1" dirty="0" smtClean="0">
+                <a:solidFill>
+                  <a:srgbClr val="7030A0"/>
+                </a:solidFill>
+              </a:rPr>
+              <a:t>Sample questions &amp; answers: </a:t>
+            </a:r>
+            <a:r>
+              <a:rPr lang="en-US" sz="2800" b="1" dirty="0" smtClean="0">
+                <a:solidFill>
+                  <a:srgbClr val="7030A0"/>
+                </a:solidFill>
+              </a:rPr>
+              <a:t>IELTS Speaking</a:t>
+            </a:r>
+            <a:endParaRPr lang="en-US" sz="4800" b="1" dirty="0">
+              <a:solidFill>
+                <a:srgbClr val="7030A0"/>
+              </a:solidFill>
+            </a:endParaRPr>
           </a:p>
         </p:txBody>
       </p:sp>
       <p:sp>
         <p:nvSpPr>
-          <p:cNvPr id="5" name="Subtitle 4"/>
+          <p:cNvPr id="3" name="Content Placeholder 2"/>
           <p:cNvSpPr>
             <a:spLocks noGrp="1"/>
           </p:cNvSpPr>
           <p:nvPr>
-            <p:ph type="subTitle" idx="1"/>
+            <p:ph sz="half" idx="1"/>
           </p:nvPr>
         </p:nvSpPr>
         <p:spPr>
           <a:xfrm>
-            <a:off x="1524000" y="3861345"/>
-            <a:ext cx="9144000" cy="1655762"/>
+            <a:off x="600501" y="1678675"/>
+            <a:ext cx="5181600" cy="4967784"/>
           </a:xfrm>
         </p:spPr>
         <p:txBody>
           <a:bodyPr/>
           <a:lstStyle/>
           <a:p>
-            <a:r>
-              <a:rPr lang="en-US" dirty="0" smtClean="0"/>
-              <a:t>IELTS Speaking Marking Criteria </a:t>
-            </a:r>
-            <a:r>
-              <a:rPr lang="en-US" sz="6000" b="1" dirty="0" smtClean="0">
-                <a:solidFill>
-                  <a:srgbClr val="FF0000"/>
-                </a:solidFill>
-              </a:rPr>
-              <a:t>3</a:t>
-            </a:r>
+            <a:pPr>
+              <a:buFont typeface="Wingdings" panose="05000000000000000000" pitchFamily="2" charset="2"/>
+              <a:buChar char="§"/>
+            </a:pPr>
+            <a:endParaRPr lang="en-US" dirty="0" smtClean="0"/>
+          </a:p>
+        </p:txBody>
+      </p:sp>
+      <p:sp>
+        <p:nvSpPr>
+          <p:cNvPr id="4" name="Content Placeholder 3"/>
+          <p:cNvSpPr>
+            <a:spLocks noGrp="1"/>
+          </p:cNvSpPr>
+          <p:nvPr>
+            <p:ph sz="half" idx="2"/>
+          </p:nvPr>
+        </p:nvSpPr>
+        <p:spPr>
+          <a:xfrm>
+            <a:off x="6080076" y="1678675"/>
+            <a:ext cx="5479577" cy="4967783"/>
+          </a:xfrm>
+        </p:spPr>
+        <p:txBody>
+          <a:bodyPr/>
+          <a:lstStyle/>
+          <a:p>
+            <a:pPr>
+              <a:buFont typeface="Wingdings" panose="05000000000000000000" pitchFamily="2" charset="2"/>
+              <a:buChar char="§"/>
+            </a:pPr>
             <a:endParaRPr lang="en-US" dirty="0"/>
           </a:p>
         </p:txBody>
@@ -32004,7 +32103,7 @@
     </p:spTree>
     <p:extLst>
       <p:ext uri="{BB962C8B-B14F-4D97-AF65-F5344CB8AC3E}">
-        <p14:creationId xmlns:p14="http://schemas.microsoft.com/office/powerpoint/2010/main" val="3702358549"/>
+        <p14:creationId xmlns:p14="http://schemas.microsoft.com/office/powerpoint/2010/main" val="1454329666"/>
       </p:ext>
     </p:extLst>
   </p:cSld>
@@ -32053,8 +32152,8 @@
         </p:nvSpPr>
         <p:spPr>
           <a:xfrm>
-            <a:off x="600499" y="353112"/>
-            <a:ext cx="10959153" cy="1325563"/>
+            <a:off x="839788" y="0"/>
+            <a:ext cx="10515600" cy="1325563"/>
           </a:xfrm>
         </p:spPr>
         <p:txBody>
@@ -32065,22 +32164,60 @@
           <a:p>
             <a:pPr algn="ctr"/>
             <a:r>
-              <a:rPr lang="en-US" sz="4800" b="1" dirty="0" smtClean="0">
+              <a:rPr lang="en-US" b="1" dirty="0" smtClean="0"/>
+              <a:t>Sources</a:t>
+            </a:r>
+            <a:r>
+              <a:rPr lang="en-US" dirty="0" smtClean="0"/>
+              <a:t> to improve </a:t>
+            </a:r>
+            <a:r>
+              <a:rPr lang="en-US" b="1" dirty="0" err="1" smtClean="0">
+                <a:solidFill>
+                  <a:srgbClr val="FF0000"/>
+                </a:solidFill>
+              </a:rPr>
+              <a:t>VocaB</a:t>
+            </a:r>
+            <a:endParaRPr lang="en-US" b="1" dirty="0">
+              <a:solidFill>
+                <a:srgbClr val="FF0000"/>
+              </a:solidFill>
+            </a:endParaRPr>
+          </a:p>
+        </p:txBody>
+      </p:sp>
+      <p:sp>
+        <p:nvSpPr>
+          <p:cNvPr id="3" name="Text Placeholder 2"/>
+          <p:cNvSpPr>
+            <a:spLocks noGrp="1"/>
+          </p:cNvSpPr>
+          <p:nvPr>
+            <p:ph type="body" idx="1"/>
+          </p:nvPr>
+        </p:nvSpPr>
+        <p:spPr>
+          <a:xfrm>
+            <a:off x="839788" y="913607"/>
+            <a:ext cx="5157787" cy="823912"/>
+          </a:xfrm>
+        </p:spPr>
+        <p:txBody>
+          <a:bodyPr>
+            <a:noAutofit/>
+          </a:bodyPr>
+          <a:lstStyle/>
+          <a:p>
+            <a:r>
+              <a:rPr lang="en-US" sz="5400" dirty="0" smtClean="0">
                 <a:solidFill>
                   <a:srgbClr val="7030A0"/>
                 </a:solidFill>
               </a:rPr>
-              <a:t>Sample questions &amp; answers: </a:t>
-            </a:r>
-            <a:r>
-              <a:rPr lang="en-US" sz="2800" b="1" dirty="0" smtClean="0">
-                <a:solidFill>
-                  <a:srgbClr val="7030A0"/>
-                </a:solidFill>
-              </a:rPr>
-              <a:t>IELTS Speaking</a:t>
-            </a:r>
-            <a:endParaRPr lang="en-US" sz="4800" b="1" dirty="0">
+              <a:t>Book</a:t>
+            </a:r>
+            <a:endParaRPr lang="en-US" sz="5400" dirty="0">
               <a:solidFill>
                 <a:srgbClr val="7030A0"/>
               </a:solidFill>
@@ -32090,35 +32227,7 @@
       </p:sp>
       <p:sp>
         <p:nvSpPr>
-          <p:cNvPr id="3" name="Content Placeholder 2"/>
-          <p:cNvSpPr>
-            <a:spLocks noGrp="1"/>
-          </p:cNvSpPr>
-          <p:nvPr>
-            <p:ph sz="half" idx="1"/>
-          </p:nvPr>
-        </p:nvSpPr>
-        <p:spPr>
-          <a:xfrm>
-            <a:off x="600501" y="1678675"/>
-            <a:ext cx="5181600" cy="4967784"/>
-          </a:xfrm>
-        </p:spPr>
-        <p:txBody>
-          <a:bodyPr/>
-          <a:lstStyle/>
-          <a:p>
-            <a:pPr>
-              <a:buFont typeface="Wingdings" panose="05000000000000000000" pitchFamily="2" charset="2"/>
-              <a:buChar char="§"/>
-            </a:pPr>
-            <a:endParaRPr lang="en-US" dirty="0" smtClean="0"/>
-          </a:p>
-        </p:txBody>
-      </p:sp>
-      <p:sp>
-        <p:nvSpPr>
-          <p:cNvPr id="4" name="Content Placeholder 3"/>
+          <p:cNvPr id="6" name="Content Placeholder 5"/>
           <p:cNvSpPr>
             <a:spLocks noGrp="1"/>
           </p:cNvSpPr>
@@ -32128,8 +32237,8 @@
         </p:nvSpPr>
         <p:spPr>
           <a:xfrm>
-            <a:off x="6080076" y="1678675"/>
-            <a:ext cx="5479577" cy="4967783"/>
+            <a:off x="927100" y="1737519"/>
+            <a:ext cx="5157787" cy="3684588"/>
           </a:xfrm>
         </p:spPr>
         <p:txBody>
@@ -32140,6 +32249,90 @@
               <a:buFont typeface="Wingdings" panose="05000000000000000000" pitchFamily="2" charset="2"/>
               <a:buChar char="§"/>
             </a:pPr>
+            <a:r>
+              <a:rPr lang="en-US" dirty="0" smtClean="0"/>
+              <a:t>IELTS Band 9 </a:t>
+            </a:r>
+            <a:r>
+              <a:rPr lang="en-US" dirty="0" err="1" smtClean="0"/>
+              <a:t>VocaB</a:t>
+            </a:r>
+            <a:r>
+              <a:rPr lang="en-US" dirty="0" smtClean="0"/>
+              <a:t> secret</a:t>
+            </a:r>
+          </a:p>
+          <a:p>
+            <a:pPr>
+              <a:buFont typeface="Wingdings" panose="05000000000000000000" pitchFamily="2" charset="2"/>
+              <a:buChar char="§"/>
+            </a:pPr>
+            <a:endParaRPr lang="en-US" dirty="0"/>
+          </a:p>
+        </p:txBody>
+      </p:sp>
+      <p:sp>
+        <p:nvSpPr>
+          <p:cNvPr id="7" name="Text Placeholder 6"/>
+          <p:cNvSpPr>
+            <a:spLocks noGrp="1"/>
+          </p:cNvSpPr>
+          <p:nvPr>
+            <p:ph type="body" sz="quarter" idx="3"/>
+          </p:nvPr>
+        </p:nvSpPr>
+        <p:spPr>
+          <a:xfrm>
+            <a:off x="6172200" y="913607"/>
+            <a:ext cx="5183188" cy="823912"/>
+          </a:xfrm>
+        </p:spPr>
+        <p:txBody>
+          <a:bodyPr>
+            <a:normAutofit/>
+          </a:bodyPr>
+          <a:lstStyle/>
+          <a:p>
+            <a:r>
+              <a:rPr lang="en-US" sz="4800" dirty="0" smtClean="0">
+                <a:solidFill>
+                  <a:srgbClr val="7030A0"/>
+                </a:solidFill>
+              </a:rPr>
+              <a:t>Website</a:t>
+            </a:r>
+            <a:endParaRPr lang="en-US" sz="4800" dirty="0">
+              <a:solidFill>
+                <a:srgbClr val="7030A0"/>
+              </a:solidFill>
+            </a:endParaRPr>
+          </a:p>
+        </p:txBody>
+      </p:sp>
+      <p:sp>
+        <p:nvSpPr>
+          <p:cNvPr id="8" name="Content Placeholder 7"/>
+          <p:cNvSpPr>
+            <a:spLocks noGrp="1"/>
+          </p:cNvSpPr>
+          <p:nvPr>
+            <p:ph sz="quarter" idx="4"/>
+          </p:nvPr>
+        </p:nvSpPr>
+        <p:spPr>
+          <a:xfrm>
+            <a:off x="6172200" y="1737519"/>
+            <a:ext cx="5183188" cy="3684588"/>
+          </a:xfrm>
+        </p:spPr>
+        <p:txBody>
+          <a:bodyPr/>
+          <a:lstStyle/>
+          <a:p>
+            <a:pPr>
+              <a:buFont typeface="Wingdings" panose="05000000000000000000" pitchFamily="2" charset="2"/>
+              <a:buChar char="§"/>
+            </a:pPr>
             <a:endParaRPr lang="en-US" dirty="0"/>
           </a:p>
         </p:txBody>
@@ -32147,7 +32340,7 @@
     </p:spTree>
     <p:extLst>
       <p:ext uri="{BB962C8B-B14F-4D97-AF65-F5344CB8AC3E}">
-        <p14:creationId xmlns:p14="http://schemas.microsoft.com/office/powerpoint/2010/main" val="4078782644"/>
+        <p14:creationId xmlns:p14="http://schemas.microsoft.com/office/powerpoint/2010/main" val="16853066"/>
       </p:ext>
     </p:extLst>
   </p:cSld>
@@ -32186,144 +32379,61 @@
       </p:grpSpPr>
       <p:sp>
         <p:nvSpPr>
-          <p:cNvPr id="2" name="Title 1"/>
+          <p:cNvPr id="4" name="Title 3"/>
           <p:cNvSpPr>
             <a:spLocks noGrp="1"/>
           </p:cNvSpPr>
           <p:nvPr>
-            <p:ph type="title"/>
+            <p:ph type="ctrTitle"/>
+          </p:nvPr>
+        </p:nvSpPr>
+        <p:spPr/>
+        <p:txBody>
+          <a:bodyPr>
+            <a:noAutofit/>
+          </a:bodyPr>
+          <a:lstStyle/>
+          <a:p>
+            <a:r>
+              <a:rPr lang="en-US" sz="8000" b="1" dirty="0" smtClean="0"/>
+              <a:t>Grammatical Range &amp; Accuracy</a:t>
+            </a:r>
+            <a:endParaRPr lang="en-US" sz="8000" b="1" dirty="0"/>
+          </a:p>
+        </p:txBody>
+      </p:sp>
+      <p:sp>
+        <p:nvSpPr>
+          <p:cNvPr id="5" name="Subtitle 4"/>
+          <p:cNvSpPr>
+            <a:spLocks noGrp="1"/>
+          </p:cNvSpPr>
+          <p:nvPr>
+            <p:ph type="subTitle" idx="1"/>
           </p:nvPr>
         </p:nvSpPr>
         <p:spPr>
           <a:xfrm>
-            <a:off x="576775" y="365125"/>
-            <a:ext cx="11057207" cy="1325563"/>
-          </a:xfrm>
-        </p:spPr>
-        <p:txBody>
-          <a:bodyPr>
-            <a:normAutofit/>
-          </a:bodyPr>
-          <a:lstStyle/>
-          <a:p>
-            <a:pPr algn="ctr"/>
-            <a:r>
-              <a:rPr lang="en-US" b="1" dirty="0" smtClean="0"/>
-              <a:t>Sources</a:t>
-            </a:r>
-            <a:r>
-              <a:rPr lang="en-US" dirty="0" smtClean="0"/>
-              <a:t> to improve </a:t>
-            </a:r>
-            <a:r>
-              <a:rPr lang="en-US" b="1" dirty="0" smtClean="0">
-                <a:solidFill>
-                  <a:srgbClr val="FF0000"/>
-                </a:solidFill>
-              </a:rPr>
-              <a:t>Grammar</a:t>
-            </a:r>
-            <a:endParaRPr lang="en-US" b="1" dirty="0">
-              <a:solidFill>
-                <a:srgbClr val="FF0000"/>
-              </a:solidFill>
-            </a:endParaRPr>
-          </a:p>
-        </p:txBody>
-      </p:sp>
-      <p:sp>
-        <p:nvSpPr>
-          <p:cNvPr id="4" name="Content Placeholder 3"/>
-          <p:cNvSpPr>
-            <a:spLocks noGrp="1"/>
-          </p:cNvSpPr>
-          <p:nvPr>
-            <p:ph sz="half" idx="1"/>
-          </p:nvPr>
-        </p:nvSpPr>
-        <p:spPr>
-          <a:xfrm>
-            <a:off x="576775" y="1825625"/>
-            <a:ext cx="5443025" cy="4351338"/>
+            <a:off x="1524000" y="3861345"/>
+            <a:ext cx="9144000" cy="1655762"/>
           </a:xfrm>
         </p:spPr>
         <p:txBody>
           <a:bodyPr/>
           <a:lstStyle/>
           <a:p>
-            <a:pPr>
-              <a:buFont typeface="Wingdings" panose="05000000000000000000" pitchFamily="2" charset="2"/>
-              <a:buChar char="§"/>
-            </a:pPr>
             <a:r>
               <a:rPr lang="en-US" dirty="0" smtClean="0"/>
-              <a:t>Book:</a:t>
-            </a:r>
-          </a:p>
-          <a:p>
-            <a:pPr lvl="1">
-              <a:buFont typeface="Wingdings" panose="05000000000000000000" pitchFamily="2" charset="2"/>
-              <a:buChar char="§"/>
-            </a:pPr>
-            <a:r>
-              <a:rPr lang="en-US" dirty="0">
-                <a:hlinkClick r:id="rId2"/>
+              <a:t>IELTS Speaking Marking Criteria </a:t>
+            </a:r>
+            <a:r>
+              <a:rPr lang="en-US" sz="6000" b="1" dirty="0" smtClean="0">
+                <a:solidFill>
+                  <a:srgbClr val="FF0000"/>
+                </a:solidFill>
               </a:rPr>
-              <a:t>http://</a:t>
-            </a:r>
-            <a:r>
-              <a:rPr lang="en-US" dirty="0" smtClean="0">
-                <a:hlinkClick r:id="rId2"/>
-              </a:rPr>
-              <a:t>www.ieltsbuddy.com/adverbial-clauses.html</a:t>
-            </a:r>
-            <a:endParaRPr lang="en-US" dirty="0" smtClean="0"/>
-          </a:p>
-          <a:p>
-            <a:pPr lvl="1">
-              <a:buFont typeface="Wingdings" panose="05000000000000000000" pitchFamily="2" charset="2"/>
-              <a:buChar char="§"/>
-            </a:pPr>
-            <a:r>
-              <a:rPr lang="en-US" strike="sngStrike" dirty="0" smtClean="0"/>
-              <a:t>IELTS </a:t>
-            </a:r>
-            <a:r>
-              <a:rPr lang="en-US" strike="sngStrike" dirty="0" smtClean="0"/>
-              <a:t>Band 9 Grammar Secret</a:t>
-            </a:r>
-            <a:r>
-              <a:rPr lang="en-US" dirty="0" smtClean="0"/>
-              <a:t> (This is for IELTS Writing)</a:t>
-            </a:r>
-            <a:endParaRPr lang="en-US" dirty="0"/>
-          </a:p>
-        </p:txBody>
-      </p:sp>
-      <p:sp>
-        <p:nvSpPr>
-          <p:cNvPr id="5" name="Content Placeholder 4"/>
-          <p:cNvSpPr>
-            <a:spLocks noGrp="1"/>
-          </p:cNvSpPr>
-          <p:nvPr>
-            <p:ph sz="half" idx="2"/>
-          </p:nvPr>
-        </p:nvSpPr>
-        <p:spPr>
-          <a:xfrm>
-            <a:off x="6172200" y="1825625"/>
-            <a:ext cx="5461782" cy="4351338"/>
-          </a:xfrm>
-        </p:spPr>
-        <p:txBody>
-          <a:bodyPr/>
-          <a:lstStyle/>
-          <a:p>
-            <a:pPr>
-              <a:buFont typeface="Wingdings" panose="05000000000000000000" pitchFamily="2" charset="2"/>
-              <a:buChar char="§"/>
-            </a:pPr>
+              <a:t>3</a:t>
+            </a:r>
             <a:endParaRPr lang="en-US" dirty="0"/>
           </a:p>
         </p:txBody>
@@ -32331,7 +32441,7 @@
     </p:spTree>
     <p:extLst>
       <p:ext uri="{BB962C8B-B14F-4D97-AF65-F5344CB8AC3E}">
-        <p14:creationId xmlns:p14="http://schemas.microsoft.com/office/powerpoint/2010/main" val="3350742611"/>
+        <p14:creationId xmlns:p14="http://schemas.microsoft.com/office/powerpoint/2010/main" val="3702358549"/>
       </p:ext>
     </p:extLst>
   </p:cSld>
@@ -32370,18 +32480,18 @@
       </p:grpSpPr>
       <p:sp>
         <p:nvSpPr>
-          <p:cNvPr id="4" name="Title 3"/>
+          <p:cNvPr id="2" name="Title 1"/>
           <p:cNvSpPr>
             <a:spLocks noGrp="1"/>
           </p:cNvSpPr>
           <p:nvPr>
-            <p:ph type="ctrTitle"/>
+            <p:ph type="title"/>
           </p:nvPr>
         </p:nvSpPr>
         <p:spPr>
           <a:xfrm>
-            <a:off x="1023582" y="1122363"/>
-            <a:ext cx="10072048" cy="2387600"/>
+            <a:off x="600499" y="353112"/>
+            <a:ext cx="10959153" cy="1325563"/>
           </a:xfrm>
         </p:spPr>
         <p:txBody>
@@ -32390,55 +32500,91 @@
           </a:bodyPr>
           <a:lstStyle/>
           <a:p>
-            <a:r>
-              <a:rPr lang="en-US" sz="11500" b="1" dirty="0" smtClean="0"/>
-              <a:t>Pronunciation</a:t>
-            </a:r>
-            <a:endParaRPr lang="en-US" sz="11500" b="1" dirty="0"/>
+            <a:pPr algn="ctr"/>
+            <a:r>
+              <a:rPr lang="en-US" sz="4800" b="1" dirty="0" smtClean="0">
+                <a:solidFill>
+                  <a:srgbClr val="7030A0"/>
+                </a:solidFill>
+              </a:rPr>
+              <a:t>Sample questions &amp; answers: </a:t>
+            </a:r>
+            <a:r>
+              <a:rPr lang="en-US" sz="2800" b="1" dirty="0" smtClean="0">
+                <a:solidFill>
+                  <a:srgbClr val="7030A0"/>
+                </a:solidFill>
+              </a:rPr>
+              <a:t>IELTS Speaking</a:t>
+            </a:r>
+            <a:endParaRPr lang="en-US" sz="4800" b="1" dirty="0">
+              <a:solidFill>
+                <a:srgbClr val="7030A0"/>
+              </a:solidFill>
+            </a:endParaRPr>
           </a:p>
         </p:txBody>
       </p:sp>
       <p:sp>
         <p:nvSpPr>
-          <p:cNvPr id="5" name="Subtitle 4"/>
+          <p:cNvPr id="3" name="Content Placeholder 2"/>
           <p:cNvSpPr>
             <a:spLocks noGrp="1"/>
           </p:cNvSpPr>
           <p:nvPr>
-            <p:ph type="subTitle" idx="1"/>
+            <p:ph sz="half" idx="1"/>
           </p:nvPr>
         </p:nvSpPr>
-        <p:spPr/>
+        <p:spPr>
+          <a:xfrm>
+            <a:off x="600501" y="1678675"/>
+            <a:ext cx="5181600" cy="4967784"/>
+          </a:xfrm>
+        </p:spPr>
         <p:txBody>
-          <a:bodyPr>
-            <a:normAutofit/>
-          </a:bodyPr>
+          <a:bodyPr/>
           <a:lstStyle/>
           <a:p>
-            <a:r>
-              <a:rPr lang="en-US" sz="3200" dirty="0" smtClean="0"/>
-              <a:t>IELTS Speaking Marking Criteria </a:t>
-            </a:r>
-            <a:r>
-              <a:rPr lang="en-US" sz="7200" b="1" dirty="0" smtClean="0">
-                <a:solidFill>
-                  <a:srgbClr val="FF0000"/>
-                </a:solidFill>
-              </a:rPr>
-              <a:t>4</a:t>
-            </a:r>
-            <a:endParaRPr lang="en-US" sz="3200" b="1" dirty="0">
-              <a:solidFill>
-                <a:srgbClr val="FF0000"/>
-              </a:solidFill>
-            </a:endParaRPr>
+            <a:pPr>
+              <a:buFont typeface="Wingdings" panose="05000000000000000000" pitchFamily="2" charset="2"/>
+              <a:buChar char="§"/>
+            </a:pPr>
+            <a:endParaRPr lang="en-US" dirty="0" smtClean="0"/>
+          </a:p>
+        </p:txBody>
+      </p:sp>
+      <p:sp>
+        <p:nvSpPr>
+          <p:cNvPr id="4" name="Content Placeholder 3"/>
+          <p:cNvSpPr>
+            <a:spLocks noGrp="1"/>
+          </p:cNvSpPr>
+          <p:nvPr>
+            <p:ph sz="half" idx="2"/>
+          </p:nvPr>
+        </p:nvSpPr>
+        <p:spPr>
+          <a:xfrm>
+            <a:off x="6080076" y="1678675"/>
+            <a:ext cx="5479577" cy="4967783"/>
+          </a:xfrm>
+        </p:spPr>
+        <p:txBody>
+          <a:bodyPr/>
+          <a:lstStyle/>
+          <a:p>
+            <a:pPr>
+              <a:buFont typeface="Wingdings" panose="05000000000000000000" pitchFamily="2" charset="2"/>
+              <a:buChar char="§"/>
+            </a:pPr>
+            <a:endParaRPr lang="en-US" dirty="0"/>
           </a:p>
         </p:txBody>
       </p:sp>
     </p:spTree>
     <p:extLst>
       <p:ext uri="{BB962C8B-B14F-4D97-AF65-F5344CB8AC3E}">
-        <p14:creationId xmlns:p14="http://schemas.microsoft.com/office/powerpoint/2010/main" val="46449440"/>
+        <p14:creationId xmlns:p14="http://schemas.microsoft.com/office/powerpoint/2010/main" val="4078782644"/>
       </p:ext>
     </p:extLst>
   </p:cSld>
@@ -32591,6 +32737,293 @@
             <p:ph type="title"/>
           </p:nvPr>
         </p:nvSpPr>
+        <p:spPr>
+          <a:xfrm>
+            <a:off x="576775" y="365125"/>
+            <a:ext cx="11057207" cy="1325563"/>
+          </a:xfrm>
+        </p:spPr>
+        <p:txBody>
+          <a:bodyPr>
+            <a:normAutofit/>
+          </a:bodyPr>
+          <a:lstStyle/>
+          <a:p>
+            <a:pPr algn="ctr"/>
+            <a:r>
+              <a:rPr lang="en-US" b="1" dirty="0" smtClean="0"/>
+              <a:t>Sources</a:t>
+            </a:r>
+            <a:r>
+              <a:rPr lang="en-US" dirty="0" smtClean="0"/>
+              <a:t> to improve </a:t>
+            </a:r>
+            <a:r>
+              <a:rPr lang="en-US" b="1" dirty="0" smtClean="0">
+                <a:solidFill>
+                  <a:srgbClr val="FF0000"/>
+                </a:solidFill>
+              </a:rPr>
+              <a:t>Grammar</a:t>
+            </a:r>
+            <a:endParaRPr lang="en-US" b="1" dirty="0">
+              <a:solidFill>
+                <a:srgbClr val="FF0000"/>
+              </a:solidFill>
+            </a:endParaRPr>
+          </a:p>
+        </p:txBody>
+      </p:sp>
+      <p:sp>
+        <p:nvSpPr>
+          <p:cNvPr id="4" name="Content Placeholder 3"/>
+          <p:cNvSpPr>
+            <a:spLocks noGrp="1"/>
+          </p:cNvSpPr>
+          <p:nvPr>
+            <p:ph sz="half" idx="1"/>
+          </p:nvPr>
+        </p:nvSpPr>
+        <p:spPr>
+          <a:xfrm>
+            <a:off x="576775" y="1825625"/>
+            <a:ext cx="5443025" cy="4351338"/>
+          </a:xfrm>
+        </p:spPr>
+        <p:txBody>
+          <a:bodyPr/>
+          <a:lstStyle/>
+          <a:p>
+            <a:pPr>
+              <a:buFont typeface="Wingdings" panose="05000000000000000000" pitchFamily="2" charset="2"/>
+              <a:buChar char="§"/>
+            </a:pPr>
+            <a:r>
+              <a:rPr lang="en-US" dirty="0" smtClean="0"/>
+              <a:t>Book:</a:t>
+            </a:r>
+          </a:p>
+          <a:p>
+            <a:pPr lvl="1">
+              <a:buFont typeface="Wingdings" panose="05000000000000000000" pitchFamily="2" charset="2"/>
+              <a:buChar char="§"/>
+            </a:pPr>
+            <a:r>
+              <a:rPr lang="en-US" dirty="0">
+                <a:hlinkClick r:id="rId2"/>
+              </a:rPr>
+              <a:t>http://</a:t>
+            </a:r>
+            <a:r>
+              <a:rPr lang="en-US" dirty="0" smtClean="0">
+                <a:hlinkClick r:id="rId2"/>
+              </a:rPr>
+              <a:t>www.ieltsbuddy.com/adverbial-clauses.html</a:t>
+            </a:r>
+            <a:endParaRPr lang="en-US" dirty="0" smtClean="0"/>
+          </a:p>
+          <a:p>
+            <a:pPr lvl="1">
+              <a:buFont typeface="Wingdings" panose="05000000000000000000" pitchFamily="2" charset="2"/>
+              <a:buChar char="§"/>
+            </a:pPr>
+            <a:r>
+              <a:rPr lang="en-US" strike="sngStrike" dirty="0" smtClean="0"/>
+              <a:t>IELTS Band 9 Grammar Secret</a:t>
+            </a:r>
+            <a:r>
+              <a:rPr lang="en-US" dirty="0" smtClean="0"/>
+              <a:t> (This is for IELTS Writing)</a:t>
+            </a:r>
+            <a:endParaRPr lang="en-US" dirty="0"/>
+          </a:p>
+        </p:txBody>
+      </p:sp>
+      <p:sp>
+        <p:nvSpPr>
+          <p:cNvPr id="5" name="Content Placeholder 4"/>
+          <p:cNvSpPr>
+            <a:spLocks noGrp="1"/>
+          </p:cNvSpPr>
+          <p:nvPr>
+            <p:ph sz="half" idx="2"/>
+          </p:nvPr>
+        </p:nvSpPr>
+        <p:spPr>
+          <a:xfrm>
+            <a:off x="6172200" y="1825625"/>
+            <a:ext cx="5461782" cy="4351338"/>
+          </a:xfrm>
+        </p:spPr>
+        <p:txBody>
+          <a:bodyPr/>
+          <a:lstStyle/>
+          <a:p>
+            <a:pPr>
+              <a:buFont typeface="Wingdings" panose="05000000000000000000" pitchFamily="2" charset="2"/>
+              <a:buChar char="§"/>
+            </a:pPr>
+            <a:endParaRPr lang="en-US" dirty="0"/>
+          </a:p>
+        </p:txBody>
+      </p:sp>
+    </p:spTree>
+    <p:extLst>
+      <p:ext uri="{BB962C8B-B14F-4D97-AF65-F5344CB8AC3E}">
+        <p14:creationId xmlns:p14="http://schemas.microsoft.com/office/powerpoint/2010/main" val="3350742611"/>
+      </p:ext>
+    </p:extLst>
+  </p:cSld>
+  <p:clrMapOvr>
+    <a:masterClrMapping/>
+  </p:clrMapOvr>
+  <p:transition spd="slow">
+    <p:wipe/>
+  </p:transition>
+  <p:timing>
+    <p:tnLst>
+      <p:par>
+        <p:cTn id="1" dur="indefinite" restart="never" nodeType="tmRoot"/>
+      </p:par>
+    </p:tnLst>
+  </p:timing>
+</p:sld>
+</file>
+
+<file path=ppt/slides/slide61.xml><?xml version="1.0" encoding="utf-8"?>
+<p:sld xmlns:a="http://schemas.openxmlformats.org/drawingml/2006/main" xmlns:r="http://schemas.openxmlformats.org/officeDocument/2006/relationships" xmlns:p="http://schemas.openxmlformats.org/presentationml/2006/main">
+  <p:cSld>
+    <p:spTree>
+      <p:nvGrpSpPr>
+        <p:cNvPr id="1" name=""/>
+        <p:cNvGrpSpPr/>
+        <p:nvPr/>
+      </p:nvGrpSpPr>
+      <p:grpSpPr>
+        <a:xfrm>
+          <a:off x="0" y="0"/>
+          <a:ext cx="0" cy="0"/>
+          <a:chOff x="0" y="0"/>
+          <a:chExt cx="0" cy="0"/>
+        </a:xfrm>
+      </p:grpSpPr>
+      <p:sp>
+        <p:nvSpPr>
+          <p:cNvPr id="4" name="Title 3"/>
+          <p:cNvSpPr>
+            <a:spLocks noGrp="1"/>
+          </p:cNvSpPr>
+          <p:nvPr>
+            <p:ph type="ctrTitle"/>
+          </p:nvPr>
+        </p:nvSpPr>
+        <p:spPr>
+          <a:xfrm>
+            <a:off x="1023582" y="1122363"/>
+            <a:ext cx="10072048" cy="2387600"/>
+          </a:xfrm>
+        </p:spPr>
+        <p:txBody>
+          <a:bodyPr>
+            <a:normAutofit/>
+          </a:bodyPr>
+          <a:lstStyle/>
+          <a:p>
+            <a:r>
+              <a:rPr lang="en-US" sz="11500" b="1" dirty="0" smtClean="0"/>
+              <a:t>Pronunciation</a:t>
+            </a:r>
+            <a:endParaRPr lang="en-US" sz="11500" b="1" dirty="0"/>
+          </a:p>
+        </p:txBody>
+      </p:sp>
+      <p:sp>
+        <p:nvSpPr>
+          <p:cNvPr id="5" name="Subtitle 4"/>
+          <p:cNvSpPr>
+            <a:spLocks noGrp="1"/>
+          </p:cNvSpPr>
+          <p:nvPr>
+            <p:ph type="subTitle" idx="1"/>
+          </p:nvPr>
+        </p:nvSpPr>
+        <p:spPr/>
+        <p:txBody>
+          <a:bodyPr>
+            <a:normAutofit/>
+          </a:bodyPr>
+          <a:lstStyle/>
+          <a:p>
+            <a:r>
+              <a:rPr lang="en-US" sz="3200" dirty="0" smtClean="0"/>
+              <a:t>IELTS Speaking Marking Criteria </a:t>
+            </a:r>
+            <a:r>
+              <a:rPr lang="en-US" sz="7200" b="1" dirty="0" smtClean="0">
+                <a:solidFill>
+                  <a:srgbClr val="FF0000"/>
+                </a:solidFill>
+              </a:rPr>
+              <a:t>4</a:t>
+            </a:r>
+            <a:endParaRPr lang="en-US" sz="3200" b="1" dirty="0">
+              <a:solidFill>
+                <a:srgbClr val="FF0000"/>
+              </a:solidFill>
+            </a:endParaRPr>
+          </a:p>
+        </p:txBody>
+      </p:sp>
+    </p:spTree>
+    <p:extLst>
+      <p:ext uri="{BB962C8B-B14F-4D97-AF65-F5344CB8AC3E}">
+        <p14:creationId xmlns:p14="http://schemas.microsoft.com/office/powerpoint/2010/main" val="46449440"/>
+      </p:ext>
+    </p:extLst>
+  </p:cSld>
+  <p:clrMapOvr>
+    <a:masterClrMapping/>
+  </p:clrMapOvr>
+  <p:transition spd="slow">
+    <p:wipe/>
+  </p:transition>
+  <p:timing>
+    <p:tnLst>
+      <p:par>
+        <p:cTn id="1" dur="indefinite" restart="never" nodeType="tmRoot"/>
+      </p:par>
+    </p:tnLst>
+  </p:timing>
+</p:sld>
+</file>
+
+<file path=ppt/slides/slide62.xml><?xml version="1.0" encoding="utf-8"?>
+<p:sld xmlns:a="http://schemas.openxmlformats.org/drawingml/2006/main" xmlns:r="http://schemas.openxmlformats.org/officeDocument/2006/relationships" xmlns:p="http://schemas.openxmlformats.org/presentationml/2006/main">
+  <p:cSld>
+    <p:spTree>
+      <p:nvGrpSpPr>
+        <p:cNvPr id="1" name=""/>
+        <p:cNvGrpSpPr/>
+        <p:nvPr/>
+      </p:nvGrpSpPr>
+      <p:grpSpPr>
+        <a:xfrm>
+          <a:off x="0" y="0"/>
+          <a:ext cx="0" cy="0"/>
+          <a:chOff x="0" y="0"/>
+          <a:chExt cx="0" cy="0"/>
+        </a:xfrm>
+      </p:grpSpPr>
+      <p:sp>
+        <p:nvSpPr>
+          <p:cNvPr id="2" name="Title 1"/>
+          <p:cNvSpPr>
+            <a:spLocks noGrp="1"/>
+          </p:cNvSpPr>
+          <p:nvPr>
+            <p:ph type="title"/>
+          </p:nvPr>
+        </p:nvSpPr>
         <p:spPr/>
         <p:txBody>
           <a:bodyPr/>
@@ -32638,7 +33071,7 @@
 </p:sld>
 </file>
 
-<file path=ppt/slides/slide61.xml><?xml version="1.0" encoding="utf-8"?>
+<file path=ppt/slides/slide63.xml><?xml version="1.0" encoding="utf-8"?>
 <p:sld xmlns:a="http://schemas.openxmlformats.org/drawingml/2006/main" xmlns:r="http://schemas.openxmlformats.org/officeDocument/2006/relationships" xmlns:p="http://schemas.openxmlformats.org/presentationml/2006/main">
   <p:cSld>
     <p:spTree>
@@ -32781,7 +33214,7 @@
 </p:sld>
 </file>
 
-<file path=ppt/slides/slide62.xml><?xml version="1.0" encoding="utf-8"?>
+<file path=ppt/slides/slide64.xml><?xml version="1.0" encoding="utf-8"?>
 <p:sld xmlns:a="http://schemas.openxmlformats.org/drawingml/2006/main" xmlns:r="http://schemas.openxmlformats.org/officeDocument/2006/relationships" xmlns:p="http://schemas.openxmlformats.org/presentationml/2006/main">
   <p:cSld>
     <p:spTree>

</xml_diff>